<commit_message>
Add latex files for Mobile
</commit_message>
<xml_diff>
--- a/Programming 4/07.1 Manual Scrolling Tile Map/07.1 Manual Scrolling Tile Map.pptx
+++ b/Programming 4/07.1 Manual Scrolling Tile Map/07.1 Manual Scrolling Tile Map.pptx
@@ -4,8 +4,14 @@
   <p:sldMasterIdLst>
     <p:sldMasterId id="2147483648" r:id="rId1"/>
   </p:sldMasterIdLst>
+  <p:notesMasterIdLst>
+    <p:notesMasterId r:id="rId6"/>
+  </p:notesMasterIdLst>
   <p:sldIdLst>
     <p:sldId id="256" r:id="rId2"/>
+    <p:sldId id="257" r:id="rId3"/>
+    <p:sldId id="258" r:id="rId4"/>
+    <p:sldId id="259" r:id="rId5"/>
   </p:sldIdLst>
   <p:sldSz cx="9144000" cy="6858000" type="screen4x3"/>
   <p:notesSz cx="6858000" cy="9144000"/>
@@ -106,10 +112,729 @@
   </p:defaultTextStyle>
   <p:extLst>
     <p:ext uri="{EFAFB233-063F-42B5-8137-9DF3F51BA10A}">
-      <p15:sldGuideLst xmlns:p15="http://schemas.microsoft.com/office/powerpoint/2012/main"/>
+      <p15:sldGuideLst xmlns:p15="http://schemas.microsoft.com/office/powerpoint/2012/main">
+        <p15:guide id="1" orient="horz" pos="2160">
+          <p15:clr>
+            <a:srgbClr val="A4A3A4"/>
+          </p15:clr>
+        </p15:guide>
+        <p15:guide id="2" pos="2880">
+          <p15:clr>
+            <a:srgbClr val="A4A3A4"/>
+          </p15:clr>
+        </p15:guide>
+      </p15:sldGuideLst>
     </p:ext>
   </p:extLst>
 </p:presentation>
+</file>
+
+<file path=ppt/notesMasters/notesMaster1.xml><?xml version="1.0" encoding="utf-8"?>
+<p:notesMaster xmlns:a="http://schemas.openxmlformats.org/drawingml/2006/main" xmlns:r="http://schemas.openxmlformats.org/officeDocument/2006/relationships" xmlns:p="http://schemas.openxmlformats.org/presentationml/2006/main">
+  <p:cSld>
+    <p:bg>
+      <p:bgRef idx="1001">
+        <a:schemeClr val="bg1"/>
+      </p:bgRef>
+    </p:bg>
+    <p:spTree>
+      <p:nvGrpSpPr>
+        <p:cNvPr id="1" name=""/>
+        <p:cNvGrpSpPr/>
+        <p:nvPr/>
+      </p:nvGrpSpPr>
+      <p:grpSpPr>
+        <a:xfrm>
+          <a:off x="0" y="0"/>
+          <a:ext cx="0" cy="0"/>
+          <a:chOff x="0" y="0"/>
+          <a:chExt cx="0" cy="0"/>
+        </a:xfrm>
+      </p:grpSpPr>
+      <p:sp>
+        <p:nvSpPr>
+          <p:cNvPr id="2" name="Header Placeholder 1"/>
+          <p:cNvSpPr>
+            <a:spLocks noGrp="1"/>
+          </p:cNvSpPr>
+          <p:nvPr>
+            <p:ph type="hdr" sz="quarter"/>
+          </p:nvPr>
+        </p:nvSpPr>
+        <p:spPr>
+          <a:xfrm>
+            <a:off x="0" y="0"/>
+            <a:ext cx="2971800" cy="458788"/>
+          </a:xfrm>
+          <a:prstGeom prst="rect">
+            <a:avLst/>
+          </a:prstGeom>
+        </p:spPr>
+        <p:txBody>
+          <a:bodyPr vert="horz" lIns="91440" tIns="45720" rIns="91440" bIns="45720" rtlCol="0"/>
+          <a:lstStyle>
+            <a:lvl1pPr algn="l">
+              <a:defRPr sz="1200"/>
+            </a:lvl1pPr>
+          </a:lstStyle>
+          <a:p>
+            <a:endParaRPr lang="en-US"/>
+          </a:p>
+        </p:txBody>
+      </p:sp>
+      <p:sp>
+        <p:nvSpPr>
+          <p:cNvPr id="3" name="Date Placeholder 2"/>
+          <p:cNvSpPr>
+            <a:spLocks noGrp="1"/>
+          </p:cNvSpPr>
+          <p:nvPr>
+            <p:ph type="dt" idx="1"/>
+          </p:nvPr>
+        </p:nvSpPr>
+        <p:spPr>
+          <a:xfrm>
+            <a:off x="3884613" y="0"/>
+            <a:ext cx="2971800" cy="458788"/>
+          </a:xfrm>
+          <a:prstGeom prst="rect">
+            <a:avLst/>
+          </a:prstGeom>
+        </p:spPr>
+        <p:txBody>
+          <a:bodyPr vert="horz" lIns="91440" tIns="45720" rIns="91440" bIns="45720" rtlCol="0"/>
+          <a:lstStyle>
+            <a:lvl1pPr algn="r">
+              <a:defRPr sz="1200"/>
+            </a:lvl1pPr>
+          </a:lstStyle>
+          <a:p>
+            <a:fld id="{5A5D9C48-5678-9443-958E-9EAAE3ED0F2B}" type="datetimeFigureOut">
+              <a:rPr lang="en-US" smtClean="0"/>
+              <a:t>8/30/19</a:t>
+            </a:fld>
+            <a:endParaRPr lang="en-US"/>
+          </a:p>
+        </p:txBody>
+      </p:sp>
+      <p:sp>
+        <p:nvSpPr>
+          <p:cNvPr id="4" name="Slide Image Placeholder 3"/>
+          <p:cNvSpPr>
+            <a:spLocks noGrp="1" noRot="1" noChangeAspect="1"/>
+          </p:cNvSpPr>
+          <p:nvPr>
+            <p:ph type="sldImg" idx="2"/>
+          </p:nvPr>
+        </p:nvSpPr>
+        <p:spPr>
+          <a:xfrm>
+            <a:off x="1371600" y="1143000"/>
+            <a:ext cx="4114800" cy="3086100"/>
+          </a:xfrm>
+          <a:prstGeom prst="rect">
+            <a:avLst/>
+          </a:prstGeom>
+          <a:noFill/>
+          <a:ln w="12700">
+            <a:solidFill>
+              <a:prstClr val="black"/>
+            </a:solidFill>
+          </a:ln>
+        </p:spPr>
+        <p:txBody>
+          <a:bodyPr vert="horz" lIns="91440" tIns="45720" rIns="91440" bIns="45720" rtlCol="0" anchor="ctr"/>
+          <a:lstStyle/>
+          <a:p>
+            <a:endParaRPr lang="en-US"/>
+          </a:p>
+        </p:txBody>
+      </p:sp>
+      <p:sp>
+        <p:nvSpPr>
+          <p:cNvPr id="5" name="Notes Placeholder 4"/>
+          <p:cNvSpPr>
+            <a:spLocks noGrp="1"/>
+          </p:cNvSpPr>
+          <p:nvPr>
+            <p:ph type="body" sz="quarter" idx="3"/>
+          </p:nvPr>
+        </p:nvSpPr>
+        <p:spPr>
+          <a:xfrm>
+            <a:off x="685800" y="4400550"/>
+            <a:ext cx="5486400" cy="3600450"/>
+          </a:xfrm>
+          <a:prstGeom prst="rect">
+            <a:avLst/>
+          </a:prstGeom>
+        </p:spPr>
+        <p:txBody>
+          <a:bodyPr vert="horz" lIns="91440" tIns="45720" rIns="91440" bIns="45720" rtlCol="0"/>
+          <a:lstStyle/>
+          <a:p>
+            <a:pPr lvl="0"/>
+            <a:r>
+              <a:rPr lang="en-US" smtClean="0"/>
+              <a:t>Click to edit Master text styles</a:t>
+            </a:r>
+          </a:p>
+          <a:p>
+            <a:pPr lvl="1"/>
+            <a:r>
+              <a:rPr lang="en-US" smtClean="0"/>
+              <a:t>Second level</a:t>
+            </a:r>
+          </a:p>
+          <a:p>
+            <a:pPr lvl="2"/>
+            <a:r>
+              <a:rPr lang="en-US" smtClean="0"/>
+              <a:t>Third level</a:t>
+            </a:r>
+          </a:p>
+          <a:p>
+            <a:pPr lvl="3"/>
+            <a:r>
+              <a:rPr lang="en-US" smtClean="0"/>
+              <a:t>Fourth level</a:t>
+            </a:r>
+          </a:p>
+          <a:p>
+            <a:pPr lvl="4"/>
+            <a:r>
+              <a:rPr lang="en-US" smtClean="0"/>
+              <a:t>Fifth level</a:t>
+            </a:r>
+            <a:endParaRPr lang="en-US"/>
+          </a:p>
+        </p:txBody>
+      </p:sp>
+      <p:sp>
+        <p:nvSpPr>
+          <p:cNvPr id="6" name="Footer Placeholder 5"/>
+          <p:cNvSpPr>
+            <a:spLocks noGrp="1"/>
+          </p:cNvSpPr>
+          <p:nvPr>
+            <p:ph type="ftr" sz="quarter" idx="4"/>
+          </p:nvPr>
+        </p:nvSpPr>
+        <p:spPr>
+          <a:xfrm>
+            <a:off x="0" y="8685213"/>
+            <a:ext cx="2971800" cy="458787"/>
+          </a:xfrm>
+          <a:prstGeom prst="rect">
+            <a:avLst/>
+          </a:prstGeom>
+        </p:spPr>
+        <p:txBody>
+          <a:bodyPr vert="horz" lIns="91440" tIns="45720" rIns="91440" bIns="45720" rtlCol="0" anchor="b"/>
+          <a:lstStyle>
+            <a:lvl1pPr algn="l">
+              <a:defRPr sz="1200"/>
+            </a:lvl1pPr>
+          </a:lstStyle>
+          <a:p>
+            <a:endParaRPr lang="en-US"/>
+          </a:p>
+        </p:txBody>
+      </p:sp>
+      <p:sp>
+        <p:nvSpPr>
+          <p:cNvPr id="7" name="Slide Number Placeholder 6"/>
+          <p:cNvSpPr>
+            <a:spLocks noGrp="1"/>
+          </p:cNvSpPr>
+          <p:nvPr>
+            <p:ph type="sldNum" sz="quarter" idx="5"/>
+          </p:nvPr>
+        </p:nvSpPr>
+        <p:spPr>
+          <a:xfrm>
+            <a:off x="3884613" y="8685213"/>
+            <a:ext cx="2971800" cy="458787"/>
+          </a:xfrm>
+          <a:prstGeom prst="rect">
+            <a:avLst/>
+          </a:prstGeom>
+        </p:spPr>
+        <p:txBody>
+          <a:bodyPr vert="horz" lIns="91440" tIns="45720" rIns="91440" bIns="45720" rtlCol="0" anchor="b"/>
+          <a:lstStyle>
+            <a:lvl1pPr algn="r">
+              <a:defRPr sz="1200"/>
+            </a:lvl1pPr>
+          </a:lstStyle>
+          <a:p>
+            <a:fld id="{AE32F7DC-12FF-884D-889E-7B8D4C4920F1}" type="slidenum">
+              <a:rPr lang="en-US" smtClean="0"/>
+              <a:t>‹#›</a:t>
+            </a:fld>
+            <a:endParaRPr lang="en-US"/>
+          </a:p>
+        </p:txBody>
+      </p:sp>
+    </p:spTree>
+    <p:extLst>
+      <p:ext uri="{BB962C8B-B14F-4D97-AF65-F5344CB8AC3E}">
+        <p14:creationId xmlns:p14="http://schemas.microsoft.com/office/powerpoint/2010/main" val="1559379187"/>
+      </p:ext>
+    </p:extLst>
+  </p:cSld>
+  <p:clrMap bg1="lt1" tx1="dk1" bg2="lt2" tx2="dk2" accent1="accent1" accent2="accent2" accent3="accent3" accent4="accent4" accent5="accent5" accent6="accent6" hlink="hlink" folHlink="folHlink"/>
+  <p:notesStyle>
+    <a:lvl1pPr marL="0" algn="l" defTabSz="914400" rtl="0" eaLnBrk="1" latinLnBrk="0" hangingPunct="1">
+      <a:defRPr sz="1200" kern="1200">
+        <a:solidFill>
+          <a:schemeClr val="tx1"/>
+        </a:solidFill>
+        <a:latin typeface="+mn-lt"/>
+        <a:ea typeface="+mn-ea"/>
+        <a:cs typeface="+mn-cs"/>
+      </a:defRPr>
+    </a:lvl1pPr>
+    <a:lvl2pPr marL="457200" algn="l" defTabSz="914400" rtl="0" eaLnBrk="1" latinLnBrk="0" hangingPunct="1">
+      <a:defRPr sz="1200" kern="1200">
+        <a:solidFill>
+          <a:schemeClr val="tx1"/>
+        </a:solidFill>
+        <a:latin typeface="+mn-lt"/>
+        <a:ea typeface="+mn-ea"/>
+        <a:cs typeface="+mn-cs"/>
+      </a:defRPr>
+    </a:lvl2pPr>
+    <a:lvl3pPr marL="914400" algn="l" defTabSz="914400" rtl="0" eaLnBrk="1" latinLnBrk="0" hangingPunct="1">
+      <a:defRPr sz="1200" kern="1200">
+        <a:solidFill>
+          <a:schemeClr val="tx1"/>
+        </a:solidFill>
+        <a:latin typeface="+mn-lt"/>
+        <a:ea typeface="+mn-ea"/>
+        <a:cs typeface="+mn-cs"/>
+      </a:defRPr>
+    </a:lvl3pPr>
+    <a:lvl4pPr marL="1371600" algn="l" defTabSz="914400" rtl="0" eaLnBrk="1" latinLnBrk="0" hangingPunct="1">
+      <a:defRPr sz="1200" kern="1200">
+        <a:solidFill>
+          <a:schemeClr val="tx1"/>
+        </a:solidFill>
+        <a:latin typeface="+mn-lt"/>
+        <a:ea typeface="+mn-ea"/>
+        <a:cs typeface="+mn-cs"/>
+      </a:defRPr>
+    </a:lvl4pPr>
+    <a:lvl5pPr marL="1828800" algn="l" defTabSz="914400" rtl="0" eaLnBrk="1" latinLnBrk="0" hangingPunct="1">
+      <a:defRPr sz="1200" kern="1200">
+        <a:solidFill>
+          <a:schemeClr val="tx1"/>
+        </a:solidFill>
+        <a:latin typeface="+mn-lt"/>
+        <a:ea typeface="+mn-ea"/>
+        <a:cs typeface="+mn-cs"/>
+      </a:defRPr>
+    </a:lvl5pPr>
+    <a:lvl6pPr marL="2286000" algn="l" defTabSz="914400" rtl="0" eaLnBrk="1" latinLnBrk="0" hangingPunct="1">
+      <a:defRPr sz="1200" kern="1200">
+        <a:solidFill>
+          <a:schemeClr val="tx1"/>
+        </a:solidFill>
+        <a:latin typeface="+mn-lt"/>
+        <a:ea typeface="+mn-ea"/>
+        <a:cs typeface="+mn-cs"/>
+      </a:defRPr>
+    </a:lvl6pPr>
+    <a:lvl7pPr marL="2743200" algn="l" defTabSz="914400" rtl="0" eaLnBrk="1" latinLnBrk="0" hangingPunct="1">
+      <a:defRPr sz="1200" kern="1200">
+        <a:solidFill>
+          <a:schemeClr val="tx1"/>
+        </a:solidFill>
+        <a:latin typeface="+mn-lt"/>
+        <a:ea typeface="+mn-ea"/>
+        <a:cs typeface="+mn-cs"/>
+      </a:defRPr>
+    </a:lvl7pPr>
+    <a:lvl8pPr marL="3200400" algn="l" defTabSz="914400" rtl="0" eaLnBrk="1" latinLnBrk="0" hangingPunct="1">
+      <a:defRPr sz="1200" kern="1200">
+        <a:solidFill>
+          <a:schemeClr val="tx1"/>
+        </a:solidFill>
+        <a:latin typeface="+mn-lt"/>
+        <a:ea typeface="+mn-ea"/>
+        <a:cs typeface="+mn-cs"/>
+      </a:defRPr>
+    </a:lvl8pPr>
+    <a:lvl9pPr marL="3657600" algn="l" defTabSz="914400" rtl="0" eaLnBrk="1" latinLnBrk="0" hangingPunct="1">
+      <a:defRPr sz="1200" kern="1200">
+        <a:solidFill>
+          <a:schemeClr val="tx1"/>
+        </a:solidFill>
+        <a:latin typeface="+mn-lt"/>
+        <a:ea typeface="+mn-ea"/>
+        <a:cs typeface="+mn-cs"/>
+      </a:defRPr>
+    </a:lvl9pPr>
+  </p:notesStyle>
+</p:notesMaster>
+</file>
+
+<file path=ppt/notesSlides/notesSlide1.xml><?xml version="1.0" encoding="utf-8"?>
+<p:notes xmlns:a="http://schemas.openxmlformats.org/drawingml/2006/main" xmlns:r="http://schemas.openxmlformats.org/officeDocument/2006/relationships" xmlns:p="http://schemas.openxmlformats.org/presentationml/2006/main">
+  <p:cSld>
+    <p:spTree>
+      <p:nvGrpSpPr>
+        <p:cNvPr id="1" name=""/>
+        <p:cNvGrpSpPr/>
+        <p:nvPr/>
+      </p:nvGrpSpPr>
+      <p:grpSpPr>
+        <a:xfrm>
+          <a:off x="0" y="0"/>
+          <a:ext cx="0" cy="0"/>
+          <a:chOff x="0" y="0"/>
+          <a:chExt cx="0" cy="0"/>
+        </a:xfrm>
+      </p:grpSpPr>
+      <p:sp>
+        <p:nvSpPr>
+          <p:cNvPr id="2" name="Slide Image Placeholder 1"/>
+          <p:cNvSpPr>
+            <a:spLocks noGrp="1" noRot="1" noChangeAspect="1"/>
+          </p:cNvSpPr>
+          <p:nvPr>
+            <p:ph type="sldImg"/>
+          </p:nvPr>
+        </p:nvSpPr>
+        <p:spPr/>
+      </p:sp>
+      <p:sp>
+        <p:nvSpPr>
+          <p:cNvPr id="3" name="Notes Placeholder 2"/>
+          <p:cNvSpPr>
+            <a:spLocks noGrp="1"/>
+          </p:cNvSpPr>
+          <p:nvPr>
+            <p:ph type="body" idx="1"/>
+          </p:nvPr>
+        </p:nvSpPr>
+        <p:spPr/>
+        <p:txBody>
+          <a:bodyPr/>
+          <a:lstStyle/>
+          <a:p>
+            <a:pPr marL="171450" indent="-171450">
+              <a:buFont typeface="Arial" panose="020B0604020202020204" pitchFamily="34" charset="0"/>
+              <a:buChar char="•"/>
+            </a:pPr>
+            <a:r>
+              <a:rPr lang="en-NZ" dirty="0" smtClean="0"/>
+              <a:t>The screen displays a portion of the world, and during game play, in response to movement of a player character (in, e.g. RPGs) or in response to manual navigation by the player (in e.g. city builders), that portion changes</a:t>
+            </a:r>
+          </a:p>
+          <a:p>
+            <a:pPr marL="171450" indent="-171450">
+              <a:buFont typeface="Arial" panose="020B0604020202020204" pitchFamily="34" charset="0"/>
+              <a:buChar char="•"/>
+            </a:pPr>
+            <a:endParaRPr lang="en-NZ" dirty="0" smtClean="0"/>
+          </a:p>
+          <a:p>
+            <a:pPr marL="171450" indent="-171450">
+              <a:buFont typeface="Arial" panose="020B0604020202020204" pitchFamily="34" charset="0"/>
+              <a:buChar char="•"/>
+            </a:pPr>
+            <a:r>
+              <a:rPr lang="en-NZ" dirty="0" smtClean="0"/>
+              <a:t>This movement is </a:t>
+            </a:r>
+            <a:r>
+              <a:rPr lang="en-NZ" smtClean="0"/>
+              <a:t>called scrolling</a:t>
+            </a:r>
+            <a:endParaRPr lang="en-NZ" dirty="0" smtClean="0"/>
+          </a:p>
+        </p:txBody>
+      </p:sp>
+      <p:sp>
+        <p:nvSpPr>
+          <p:cNvPr id="4" name="Slide Number Placeholder 3"/>
+          <p:cNvSpPr>
+            <a:spLocks noGrp="1"/>
+          </p:cNvSpPr>
+          <p:nvPr>
+            <p:ph type="sldNum" sz="quarter" idx="10"/>
+          </p:nvPr>
+        </p:nvSpPr>
+        <p:spPr/>
+        <p:txBody>
+          <a:bodyPr/>
+          <a:lstStyle/>
+          <a:p>
+            <a:fld id="{BBC1DE02-C006-4F38-873D-E62701AB1734}" type="slidenum">
+              <a:rPr lang="en-NZ" smtClean="0"/>
+              <a:t>2</a:t>
+            </a:fld>
+            <a:endParaRPr lang="en-NZ"/>
+          </a:p>
+        </p:txBody>
+      </p:sp>
+    </p:spTree>
+    <p:extLst>
+      <p:ext uri="{BB962C8B-B14F-4D97-AF65-F5344CB8AC3E}">
+        <p14:creationId xmlns:p14="http://schemas.microsoft.com/office/powerpoint/2010/main" val="595567921"/>
+      </p:ext>
+    </p:extLst>
+  </p:cSld>
+  <p:clrMapOvr>
+    <a:masterClrMapping/>
+  </p:clrMapOvr>
+</p:notes>
+</file>
+
+<file path=ppt/notesSlides/notesSlide2.xml><?xml version="1.0" encoding="utf-8"?>
+<p:notes xmlns:a="http://schemas.openxmlformats.org/drawingml/2006/main" xmlns:r="http://schemas.openxmlformats.org/officeDocument/2006/relationships" xmlns:p="http://schemas.openxmlformats.org/presentationml/2006/main">
+  <p:cSld>
+    <p:spTree>
+      <p:nvGrpSpPr>
+        <p:cNvPr id="1" name=""/>
+        <p:cNvGrpSpPr/>
+        <p:nvPr/>
+      </p:nvGrpSpPr>
+      <p:grpSpPr>
+        <a:xfrm>
+          <a:off x="0" y="0"/>
+          <a:ext cx="0" cy="0"/>
+          <a:chOff x="0" y="0"/>
+          <a:chExt cx="0" cy="0"/>
+        </a:xfrm>
+      </p:grpSpPr>
+      <p:sp>
+        <p:nvSpPr>
+          <p:cNvPr id="2" name="Slide Image Placeholder 1"/>
+          <p:cNvSpPr>
+            <a:spLocks noGrp="1" noRot="1" noChangeAspect="1"/>
+          </p:cNvSpPr>
+          <p:nvPr>
+            <p:ph type="sldImg"/>
+          </p:nvPr>
+        </p:nvSpPr>
+        <p:spPr/>
+      </p:sp>
+      <p:sp>
+        <p:nvSpPr>
+          <p:cNvPr id="3" name="Notes Placeholder 2"/>
+          <p:cNvSpPr>
+            <a:spLocks noGrp="1"/>
+          </p:cNvSpPr>
+          <p:nvPr>
+            <p:ph type="body" idx="1"/>
+          </p:nvPr>
+        </p:nvSpPr>
+        <p:spPr/>
+        <p:txBody>
+          <a:bodyPr/>
+          <a:lstStyle/>
+          <a:p>
+            <a:pPr marL="171450" indent="-171450">
+              <a:buFont typeface="Arial" panose="020B0604020202020204" pitchFamily="34" charset="0"/>
+              <a:buChar char="•"/>
+            </a:pPr>
+            <a:endParaRPr lang="en-NZ" dirty="0" smtClean="0"/>
+          </a:p>
+        </p:txBody>
+      </p:sp>
+      <p:sp>
+        <p:nvSpPr>
+          <p:cNvPr id="4" name="Slide Number Placeholder 3"/>
+          <p:cNvSpPr>
+            <a:spLocks noGrp="1"/>
+          </p:cNvSpPr>
+          <p:nvPr>
+            <p:ph type="sldNum" sz="quarter" idx="10"/>
+          </p:nvPr>
+        </p:nvSpPr>
+        <p:spPr/>
+        <p:txBody>
+          <a:bodyPr/>
+          <a:lstStyle/>
+          <a:p>
+            <a:fld id="{BBC1DE02-C006-4F38-873D-E62701AB1734}" type="slidenum">
+              <a:rPr lang="en-NZ" smtClean="0"/>
+              <a:t>3</a:t>
+            </a:fld>
+            <a:endParaRPr lang="en-NZ"/>
+          </a:p>
+        </p:txBody>
+      </p:sp>
+    </p:spTree>
+    <p:extLst>
+      <p:ext uri="{BB962C8B-B14F-4D97-AF65-F5344CB8AC3E}">
+        <p14:creationId xmlns:p14="http://schemas.microsoft.com/office/powerpoint/2010/main" val="790220199"/>
+      </p:ext>
+    </p:extLst>
+  </p:cSld>
+  <p:clrMapOvr>
+    <a:masterClrMapping/>
+  </p:clrMapOvr>
+</p:notes>
+</file>
+
+<file path=ppt/notesSlides/notesSlide3.xml><?xml version="1.0" encoding="utf-8"?>
+<p:notes xmlns:a="http://schemas.openxmlformats.org/drawingml/2006/main" xmlns:r="http://schemas.openxmlformats.org/officeDocument/2006/relationships" xmlns:p="http://schemas.openxmlformats.org/presentationml/2006/main">
+  <p:cSld>
+    <p:spTree>
+      <p:nvGrpSpPr>
+        <p:cNvPr id="1" name=""/>
+        <p:cNvGrpSpPr/>
+        <p:nvPr/>
+      </p:nvGrpSpPr>
+      <p:grpSpPr>
+        <a:xfrm>
+          <a:off x="0" y="0"/>
+          <a:ext cx="0" cy="0"/>
+          <a:chOff x="0" y="0"/>
+          <a:chExt cx="0" cy="0"/>
+        </a:xfrm>
+      </p:grpSpPr>
+      <p:sp>
+        <p:nvSpPr>
+          <p:cNvPr id="2" name="Slide Image Placeholder 1"/>
+          <p:cNvSpPr>
+            <a:spLocks noGrp="1" noRot="1" noChangeAspect="1"/>
+          </p:cNvSpPr>
+          <p:nvPr>
+            <p:ph type="sldImg"/>
+          </p:nvPr>
+        </p:nvSpPr>
+        <p:spPr/>
+      </p:sp>
+      <p:sp>
+        <p:nvSpPr>
+          <p:cNvPr id="3" name="Notes Placeholder 2"/>
+          <p:cNvSpPr>
+            <a:spLocks noGrp="1"/>
+          </p:cNvSpPr>
+          <p:nvPr>
+            <p:ph type="body" idx="1"/>
+          </p:nvPr>
+        </p:nvSpPr>
+        <p:spPr/>
+        <p:txBody>
+          <a:bodyPr/>
+          <a:lstStyle/>
+          <a:p>
+            <a:pPr marL="171450" indent="-171450">
+              <a:buFont typeface="Arial" panose="020B0604020202020204" pitchFamily="34" charset="0"/>
+              <a:buChar char="•"/>
+            </a:pPr>
+            <a:r>
+              <a:rPr lang="en-NZ" dirty="0" smtClean="0"/>
+              <a:t>Using Super Mario Bros (Original NES version) as an example</a:t>
+            </a:r>
+          </a:p>
+          <a:p>
+            <a:pPr marL="171450" indent="-171450">
+              <a:buFont typeface="Arial" panose="020B0604020202020204" pitchFamily="34" charset="0"/>
+              <a:buChar char="•"/>
+            </a:pPr>
+            <a:endParaRPr lang="en-NZ" dirty="0" smtClean="0"/>
+          </a:p>
+          <a:p>
+            <a:pPr marL="171450" indent="-171450">
+              <a:buFont typeface="Arial" panose="020B0604020202020204" pitchFamily="34" charset="0"/>
+              <a:buChar char="•"/>
+            </a:pPr>
+            <a:r>
+              <a:rPr lang="en-NZ" dirty="0" smtClean="0"/>
+              <a:t>SMB uses 16x16 pixel tiles, but everything here applies to any tile size</a:t>
+            </a:r>
+          </a:p>
+          <a:p>
+            <a:pPr marL="171450" indent="-171450">
+              <a:buFont typeface="Arial" panose="020B0604020202020204" pitchFamily="34" charset="0"/>
+              <a:buChar char="•"/>
+            </a:pPr>
+            <a:endParaRPr lang="en-NZ" dirty="0" smtClean="0"/>
+          </a:p>
+          <a:p>
+            <a:pPr marL="171450" indent="-171450">
+              <a:buFont typeface="Arial" panose="020B0604020202020204" pitchFamily="34" charset="0"/>
+              <a:buChar char="•"/>
+            </a:pPr>
+            <a:r>
+              <a:rPr lang="en-NZ" dirty="0" smtClean="0"/>
+              <a:t>SMB uses a world that is very wide, but only one screen high. Again, everything here applies to games with large worlds in both</a:t>
+            </a:r>
+            <a:r>
+              <a:rPr lang="en-NZ" baseline="0" dirty="0" smtClean="0"/>
+              <a:t> </a:t>
+            </a:r>
+            <a:r>
+              <a:rPr lang="en-NZ" dirty="0" smtClean="0"/>
+              <a:t>dimensions. You just need to extend to the y‐axis</a:t>
+            </a:r>
+          </a:p>
+          <a:p>
+            <a:pPr marL="171450" indent="-171450">
+              <a:buFont typeface="Arial" panose="020B0604020202020204" pitchFamily="34" charset="0"/>
+              <a:buChar char="•"/>
+            </a:pPr>
+            <a:endParaRPr lang="en-NZ" dirty="0" smtClean="0"/>
+          </a:p>
+          <a:p>
+            <a:pPr marL="171450" indent="-171450">
+              <a:buFont typeface="Arial" panose="020B0604020202020204" pitchFamily="34" charset="0"/>
+              <a:buChar char="•"/>
+            </a:pPr>
+            <a:r>
+              <a:rPr lang="en-NZ" dirty="0" smtClean="0"/>
+              <a:t>This image shows the whole world for one level. It is 211 tiles wide</a:t>
+            </a:r>
+          </a:p>
+          <a:p>
+            <a:pPr marL="171450" indent="-171450">
+              <a:buFont typeface="Arial" panose="020B0604020202020204" pitchFamily="34" charset="0"/>
+              <a:buChar char="•"/>
+            </a:pPr>
+            <a:endParaRPr lang="en-NZ" dirty="0" smtClean="0"/>
+          </a:p>
+        </p:txBody>
+      </p:sp>
+      <p:sp>
+        <p:nvSpPr>
+          <p:cNvPr id="4" name="Slide Number Placeholder 3"/>
+          <p:cNvSpPr>
+            <a:spLocks noGrp="1"/>
+          </p:cNvSpPr>
+          <p:nvPr>
+            <p:ph type="sldNum" sz="quarter" idx="10"/>
+          </p:nvPr>
+        </p:nvSpPr>
+        <p:spPr/>
+        <p:txBody>
+          <a:bodyPr/>
+          <a:lstStyle/>
+          <a:p>
+            <a:fld id="{BBC1DE02-C006-4F38-873D-E62701AB1734}" type="slidenum">
+              <a:rPr lang="en-NZ" smtClean="0"/>
+              <a:t>4</a:t>
+            </a:fld>
+            <a:endParaRPr lang="en-NZ"/>
+          </a:p>
+        </p:txBody>
+      </p:sp>
+    </p:spTree>
+    <p:extLst>
+      <p:ext uri="{BB962C8B-B14F-4D97-AF65-F5344CB8AC3E}">
+        <p14:creationId xmlns:p14="http://schemas.microsoft.com/office/powerpoint/2010/main" val="568597630"/>
+      </p:ext>
+    </p:extLst>
+  </p:cSld>
+  <p:clrMapOvr>
+    <a:masterClrMapping/>
+  </p:clrMapOvr>
+</p:notes>
 </file>
 
 <file path=ppt/slideLayouts/slideLayout1.xml><?xml version="1.0" encoding="utf-8"?>
@@ -293,7 +1018,7 @@
           <a:p>
             <a:fld id="{F8166F1F-CE9B-4651-A6AA-CD717754106B}" type="datetimeFigureOut">
               <a:rPr lang="en-US" smtClean="0"/>
-              <a:t>7/1/2019</a:t>
+              <a:t>8/30/19</a:t>
             </a:fld>
             <a:endParaRPr lang="en-US"/>
           </a:p>
@@ -458,7 +1183,7 @@
           <a:p>
             <a:fld id="{A76116CE-C4A3-4A05-B2D7-7C2E9A889C0F}" type="datetimeFigureOut">
               <a:rPr lang="en-US" smtClean="0"/>
-              <a:t>1/30/2017</a:t>
+              <a:t>8/30/19</a:t>
             </a:fld>
             <a:endParaRPr lang="en-US"/>
           </a:p>
@@ -633,7 +1358,7 @@
           <a:p>
             <a:fld id="{A76116CE-C4A3-4A05-B2D7-7C2E9A889C0F}" type="datetimeFigureOut">
               <a:rPr lang="en-US" smtClean="0"/>
-              <a:t>1/30/2017</a:t>
+              <a:t>8/30/19</a:t>
             </a:fld>
             <a:endParaRPr lang="en-US"/>
           </a:p>
@@ -800,7 +1525,7 @@
           <a:p>
             <a:fld id="{A76116CE-C4A3-4A05-B2D7-7C2E9A889C0F}" type="datetimeFigureOut">
               <a:rPr lang="en-US" smtClean="0"/>
-              <a:t>7/1/2019</a:t>
+              <a:t>8/30/19</a:t>
             </a:fld>
             <a:endParaRPr lang="en-US"/>
           </a:p>
@@ -1041,7 +1766,7 @@
           <a:p>
             <a:fld id="{A76116CE-C4A3-4A05-B2D7-7C2E9A889C0F}" type="datetimeFigureOut">
               <a:rPr lang="en-US" smtClean="0"/>
-              <a:t>7/1/2019</a:t>
+              <a:t>8/30/19</a:t>
             </a:fld>
             <a:endParaRPr lang="en-US"/>
           </a:p>
@@ -1324,7 +2049,7 @@
           <a:p>
             <a:fld id="{A76116CE-C4A3-4A05-B2D7-7C2E9A889C0F}" type="datetimeFigureOut">
               <a:rPr lang="en-US" smtClean="0"/>
-              <a:t>1/30/2017</a:t>
+              <a:t>8/30/19</a:t>
             </a:fld>
             <a:endParaRPr lang="en-US"/>
           </a:p>
@@ -1741,7 +2466,7 @@
           <a:p>
             <a:fld id="{A76116CE-C4A3-4A05-B2D7-7C2E9A889C0F}" type="datetimeFigureOut">
               <a:rPr lang="en-US" smtClean="0"/>
-              <a:t>1/30/2017</a:t>
+              <a:t>8/30/19</a:t>
             </a:fld>
             <a:endParaRPr lang="en-US"/>
           </a:p>
@@ -1854,7 +2579,7 @@
           <a:p>
             <a:fld id="{A76116CE-C4A3-4A05-B2D7-7C2E9A889C0F}" type="datetimeFigureOut">
               <a:rPr lang="en-US" smtClean="0"/>
-              <a:t>1/30/2017</a:t>
+              <a:t>8/30/19</a:t>
             </a:fld>
             <a:endParaRPr lang="en-US"/>
           </a:p>
@@ -1944,7 +2669,7 @@
           <a:p>
             <a:fld id="{A76116CE-C4A3-4A05-B2D7-7C2E9A889C0F}" type="datetimeFigureOut">
               <a:rPr lang="en-US" smtClean="0"/>
-              <a:t>1/30/2017</a:t>
+              <a:t>8/30/19</a:t>
             </a:fld>
             <a:endParaRPr lang="en-US"/>
           </a:p>
@@ -2216,7 +2941,7 @@
           <a:p>
             <a:fld id="{A76116CE-C4A3-4A05-B2D7-7C2E9A889C0F}" type="datetimeFigureOut">
               <a:rPr lang="en-US" smtClean="0"/>
-              <a:t>1/30/2017</a:t>
+              <a:t>8/30/19</a:t>
             </a:fld>
             <a:endParaRPr lang="en-US"/>
           </a:p>
@@ -2464,7 +3189,7 @@
           <a:p>
             <a:fld id="{A76116CE-C4A3-4A05-B2D7-7C2E9A889C0F}" type="datetimeFigureOut">
               <a:rPr lang="en-US" smtClean="0"/>
-              <a:t>1/30/2017</a:t>
+              <a:t>8/30/19</a:t>
             </a:fld>
             <a:endParaRPr lang="en-US"/>
           </a:p>
@@ -2672,7 +3397,7 @@
           <a:p>
             <a:fld id="{F8166F1F-CE9B-4651-A6AA-CD717754106B}" type="datetimeFigureOut">
               <a:rPr lang="en-US" smtClean="0"/>
-              <a:t>6/13/2013</a:t>
+              <a:t>8/30/19</a:t>
             </a:fld>
             <a:endParaRPr lang="en-US"/>
           </a:p>
@@ -2750,7 +3475,7 @@
           <a:p>
             <a:fld id="{F7021451-1387-4CA6-816F-3879F97B5CBC}" type="slidenum">
               <a:rPr lang="en-US" smtClean="0"/>
-              <a:t>�#�</a:t>
+              <a:t>‹#›</a:t>
             </a:fld>
             <a:endParaRPr lang="en-US"/>
           </a:p>
@@ -2761,16 +3486,16 @@
   <p:clrMap bg1="lt1" tx1="dk1" bg2="lt2" tx2="dk2" accent1="accent1" accent2="accent2" accent3="accent3" accent4="accent4" accent5="accent5" accent6="accent6" hlink="hlink" folHlink="folHlink"/>
   <p:sldLayoutIdLst>
     <p:sldLayoutId id="2147483649" r:id="rId1"/>
-    <p:sldLayoutId id="2147483650" r:id="rId3"/>
-    <p:sldLayoutId id="2147483651" r:id="rId4"/>
-    <p:sldLayoutId id="2147483652" r:id="rId5"/>
-    <p:sldLayoutId id="2147483653" r:id="rId6"/>
-    <p:sldLayoutId id="2147483654" r:id="rId7"/>
-    <p:sldLayoutId id="2147483655" r:id="rId8"/>
-    <p:sldLayoutId id="2147483656" r:id="rId9"/>
-    <p:sldLayoutId id="2147483657" r:id="rId10"/>
-    <p:sldLayoutId id="2147483658" r:id="rId11"/>
-    <p:sldLayoutId id="2147483659" r:id="rId12"/>
+    <p:sldLayoutId id="2147483650" r:id="rId2"/>
+    <p:sldLayoutId id="2147483651" r:id="rId3"/>
+    <p:sldLayoutId id="2147483652" r:id="rId4"/>
+    <p:sldLayoutId id="2147483653" r:id="rId5"/>
+    <p:sldLayoutId id="2147483654" r:id="rId6"/>
+    <p:sldLayoutId id="2147483655" r:id="rId7"/>
+    <p:sldLayoutId id="2147483656" r:id="rId8"/>
+    <p:sldLayoutId id="2147483657" r:id="rId9"/>
+    <p:sldLayoutId id="2147483658" r:id="rId10"/>
+    <p:sldLayoutId id="2147483659" r:id="rId11"/>
   </p:sldLayoutIdLst>
   <p:txStyles>
     <p:titleStyle>
@@ -3027,7 +3752,7 @@
 
 <file path=ppt/slides/slide1.xml><?xml version="1.0" encoding="utf-8"?>
 <p:sld xmlns:a="http://schemas.openxmlformats.org/drawingml/2006/main" xmlns:r="http://schemas.openxmlformats.org/officeDocument/2006/relationships" xmlns:p="http://schemas.openxmlformats.org/presentationml/2006/main">
-  <p:cSld name="Title Slide">
+  <p:cSld>
     <p:spTree>
       <p:nvGrpSpPr>
         <p:cNvPr id="1" name=""/>
@@ -3044,202 +3769,511 @@
       </p:grpSpPr>
       <p:sp>
         <p:nvSpPr>
-          <p:cNvPr id="2" name="Title 1"/>
-          <p:cNvSpPr>
-            <a:spLocks noGrp="1"/>
-          </p:cNvSpPr>
-          <p:nvPr>
-            <p:ph type="ctrTitle"/>
-          </p:nvPr>
+          <p:cNvPr id="2" name="Rectangle 1"/>
+          <p:cNvSpPr/>
+          <p:nvPr/>
         </p:nvSpPr>
         <p:spPr>
           <a:xfrm>
-            <a:off x="685800" y="2130425"/>
-            <a:ext cx="7772400" cy="1470025"/>
+            <a:off x="0" y="2133600"/>
+            <a:ext cx="9144000" cy="2300630"/>
           </a:xfrm>
+          <a:prstGeom prst="rect">
+            <a:avLst/>
+          </a:prstGeom>
+          <a:noFill/>
         </p:spPr>
         <p:txBody>
-          <a:bodyPr/>
-          <a:lstStyle/>
-          <a:p>
-            <a:r>
-              <a:rPr lang="en-US" smtClean="0"/>
-              <a:t>Click to edit Master title style</a:t>
-            </a:r>
-            <a:endParaRPr lang="en-US"/>
-          </a:p>
-        </p:txBody>
-      </p:sp>
-      <p:sp>
-        <p:nvSpPr>
-          <p:cNvPr id="3" name="Subtitle 2"/>
-          <p:cNvSpPr>
-            <a:spLocks noGrp="1"/>
-          </p:cNvSpPr>
-          <p:nvPr>
-            <p:ph type="subTitle" idx="1"/>
-          </p:nvPr>
-        </p:nvSpPr>
-        <p:spPr>
-          <a:xfrm>
-            <a:off x="1371600" y="3886200"/>
-            <a:ext cx="6400800" cy="1752600"/>
-          </a:xfrm>
-        </p:spPr>
-        <p:txBody>
-          <a:bodyPr/>
-          <a:lstStyle>
-            <a:lvl1pPr marL="0" indent="0" algn="ctr">
-              <a:buNone/>
-              <a:defRPr>
-                <a:solidFill>
-                  <a:schemeClr val="tx1">
-                    <a:tint val="75000"/>
-                  </a:schemeClr>
-                </a:solidFill>
-              </a:defRPr>
-            </a:lvl1pPr>
-            <a:lvl2pPr marL="457200" indent="0" algn="ctr">
-              <a:buNone/>
-              <a:defRPr>
-                <a:solidFill>
-                  <a:schemeClr val="tx1">
-                    <a:tint val="75000"/>
-                  </a:schemeClr>
-                </a:solidFill>
-              </a:defRPr>
-            </a:lvl2pPr>
-            <a:lvl3pPr marL="914400" indent="0" algn="ctr">
-              <a:buNone/>
-              <a:defRPr>
-                <a:solidFill>
-                  <a:schemeClr val="tx1">
-                    <a:tint val="75000"/>
-                  </a:schemeClr>
-                </a:solidFill>
-              </a:defRPr>
-            </a:lvl3pPr>
-            <a:lvl4pPr marL="1371600" indent="0" algn="ctr">
-              <a:buNone/>
-              <a:defRPr>
-                <a:solidFill>
-                  <a:schemeClr val="tx1">
-                    <a:tint val="75000"/>
-                  </a:schemeClr>
-                </a:solidFill>
-              </a:defRPr>
-            </a:lvl4pPr>
-            <a:lvl5pPr marL="1828800" indent="0" algn="ctr">
-              <a:buNone/>
-              <a:defRPr>
-                <a:solidFill>
-                  <a:schemeClr val="tx1">
-                    <a:tint val="75000"/>
-                  </a:schemeClr>
-                </a:solidFill>
-              </a:defRPr>
-            </a:lvl5pPr>
-            <a:lvl6pPr marL="2286000" indent="0" algn="ctr">
-              <a:buNone/>
-              <a:defRPr>
-                <a:solidFill>
-                  <a:schemeClr val="tx1">
-                    <a:tint val="75000"/>
-                  </a:schemeClr>
-                </a:solidFill>
-              </a:defRPr>
-            </a:lvl6pPr>
-            <a:lvl7pPr marL="2743200" indent="0" algn="ctr">
-              <a:buNone/>
-              <a:defRPr>
-                <a:solidFill>
-                  <a:schemeClr val="tx1">
-                    <a:tint val="75000"/>
-                  </a:schemeClr>
-                </a:solidFill>
-              </a:defRPr>
-            </a:lvl7pPr>
-            <a:lvl8pPr marL="3200400" indent="0" algn="ctr">
-              <a:buNone/>
-              <a:defRPr>
-                <a:solidFill>
-                  <a:schemeClr val="tx1">
-                    <a:tint val="75000"/>
-                  </a:schemeClr>
-                </a:solidFill>
-              </a:defRPr>
-            </a:lvl8pPr>
-            <a:lvl9pPr marL="3657600" indent="0" algn="ctr">
-              <a:buNone/>
-              <a:defRPr>
-                <a:solidFill>
-                  <a:schemeClr val="tx1">
-                    <a:tint val="75000"/>
-                  </a:schemeClr>
-                </a:solidFill>
-              </a:defRPr>
-            </a:lvl9pPr>
-          </a:lstStyle>
-          <a:p>
-            <a:r>
-              <a:rPr lang="en-US" smtClean="0"/>
-              <a:t>Click to edit Master subtitle style</a:t>
-            </a:r>
-            <a:endParaRPr lang="en-US"/>
-          </a:p>
-        </p:txBody>
-      </p:sp>
-      <p:sp>
-        <p:nvSpPr>
-          <p:cNvPr id="4" name="Date Placeholder 3"/>
-          <p:cNvSpPr>
-            <a:spLocks noGrp="1"/>
-          </p:cNvSpPr>
-          <p:nvPr>
-            <p:ph type="dt" sz="half" idx="10"/>
-          </p:nvPr>
-        </p:nvSpPr>
-        <p:spPr/>
-        <p:txBody>
-          <a:bodyPr/>
-          <a:lstStyle/>
-          <a:p>
-            <a:fld id="{F8166F1F-CE9B-4651-A6AA-CD717754106B}" type="datetimeFigureOut">
-              <a:rPr lang="en-US" smtClean="0"/>
-              <a:t>7/1/2019</a:t>
-            </a:fld>
-            <a:endParaRPr lang="en-US"/>
-          </a:p>
-        </p:txBody>
-      </p:sp>
-      <p:sp>
-        <p:nvSpPr>
-          <p:cNvPr id="5" name="Slide Number Placeholder 5"/>
-          <p:cNvSpPr>
-            <a:spLocks noGrp="1"/>
-          </p:cNvSpPr>
-          <p:nvPr>
-            <p:ph type="sldNum" sz="quarter" idx="12"/>
-          </p:nvPr>
-        </p:nvSpPr>
-        <p:spPr/>
-        <p:txBody>
-          <a:bodyPr/>
-          <a:lstStyle/>
-          <a:p>
-            <a:fld id="{B1393E5F-521B-4CAD-9D3A-AE923D912DCE}" type="slidenum">
-              <a:rPr lang="en-US" smtClean="0"/>
-              <a:t>‹#›</a:t>
-            </a:fld>
-            <a:endParaRPr lang="en-US"/>
+          <a:bodyPr wrap="square" lIns="68580" tIns="34290" rIns="68580" bIns="34290">
+            <a:spAutoFit/>
+          </a:bodyPr>
+          <a:lstStyle/>
+          <a:p>
+            <a:pPr algn="ctr"/>
+            <a:r>
+              <a:rPr lang="en-US" sz="4000" b="1" dirty="0"/>
+              <a:t>Programming </a:t>
+            </a:r>
+            <a:r>
+              <a:rPr lang="en-US" sz="4000" b="1" dirty="0" smtClean="0"/>
+              <a:t>4</a:t>
+            </a:r>
+            <a:endParaRPr lang="en-US" sz="2500" b="1" dirty="0"/>
+          </a:p>
+          <a:p>
+            <a:pPr algn="ctr"/>
+            <a:r>
+              <a:rPr lang="en-US" sz="4000" b="1" dirty="0" smtClean="0"/>
+              <a:t>07.1 Manual Scrolling Tile Map</a:t>
+            </a:r>
+          </a:p>
+          <a:p>
+            <a:pPr algn="ctr"/>
+            <a:endParaRPr lang="en-US" sz="2500" b="1" dirty="0"/>
+          </a:p>
+          <a:p>
+            <a:pPr algn="ctr"/>
+            <a:r>
+              <a:rPr lang="en-US" sz="4000" b="1" dirty="0"/>
+              <a:t>Semester 2</a:t>
+            </a:r>
+            <a:r>
+              <a:rPr lang="en-US" sz="4000" b="1" dirty="0" smtClean="0"/>
+              <a:t>, </a:t>
+            </a:r>
+            <a:r>
+              <a:rPr lang="en-US" sz="4000" b="1" dirty="0"/>
+              <a:t>2019</a:t>
+            </a:r>
           </a:p>
         </p:txBody>
       </p:sp>
     </p:spTree>
+    <p:extLst>
+      <p:ext uri="{BB962C8B-B14F-4D97-AF65-F5344CB8AC3E}">
+        <p14:creationId xmlns:p14="http://schemas.microsoft.com/office/powerpoint/2010/main" val="1415841683"/>
+      </p:ext>
+    </p:extLst>
   </p:cSld>
   <p:clrMapOvr>
     <a:masterClrMapping/>
   </p:clrMapOvr>
+  <p:timing>
+    <p:tnLst>
+      <p:par>
+        <p:cTn id="1" dur="indefinite" restart="never" nodeType="tmRoot"/>
+      </p:par>
+    </p:tnLst>
+  </p:timing>
+</p:sld>
+</file>
+
+<file path=ppt/slides/slide2.xml><?xml version="1.0" encoding="utf-8"?>
+<p:sld xmlns:a="http://schemas.openxmlformats.org/drawingml/2006/main" xmlns:r="http://schemas.openxmlformats.org/officeDocument/2006/relationships" xmlns:p="http://schemas.openxmlformats.org/presentationml/2006/main">
+  <p:cSld>
+    <p:spTree>
+      <p:nvGrpSpPr>
+        <p:cNvPr id="1" name=""/>
+        <p:cNvGrpSpPr/>
+        <p:nvPr/>
+      </p:nvGrpSpPr>
+      <p:grpSpPr>
+        <a:xfrm>
+          <a:off x="0" y="0"/>
+          <a:ext cx="0" cy="0"/>
+          <a:chOff x="0" y="0"/>
+          <a:chExt cx="0" cy="0"/>
+        </a:xfrm>
+      </p:grpSpPr>
+      <p:sp>
+        <p:nvSpPr>
+          <p:cNvPr id="3" name="Rectangle 2"/>
+          <p:cNvSpPr/>
+          <p:nvPr/>
+        </p:nvSpPr>
+        <p:spPr>
+          <a:xfrm>
+            <a:off x="0" y="0"/>
+            <a:ext cx="9144000" cy="4324261"/>
+          </a:xfrm>
+          <a:prstGeom prst="rect">
+            <a:avLst/>
+          </a:prstGeom>
+        </p:spPr>
+        <p:txBody>
+          <a:bodyPr wrap="square">
+            <a:spAutoFit/>
+          </a:bodyPr>
+          <a:lstStyle/>
+          <a:p>
+            <a:pPr algn="ctr"/>
+            <a:endParaRPr lang="en-US" sz="4000" b="1" dirty="0"/>
+          </a:p>
+          <a:p>
+            <a:pPr lvl="1"/>
+            <a:r>
+              <a:rPr lang="en-AU" sz="3500" b="1" dirty="0" smtClean="0"/>
+              <a:t>Scrolling</a:t>
+            </a:r>
+            <a:endParaRPr lang="en-US" sz="3500" b="1" dirty="0" smtClean="0"/>
+          </a:p>
+          <a:p>
+            <a:pPr marL="1657350" lvl="2" indent="-742950">
+              <a:buFont typeface="Arial" panose="020B0604020202020204" pitchFamily="34" charset="0"/>
+              <a:buChar char="•"/>
+            </a:pPr>
+            <a:endParaRPr lang="en-US" sz="2500" dirty="0" smtClean="0"/>
+          </a:p>
+          <a:p>
+            <a:pPr marL="1657350" lvl="2" indent="-742950">
+              <a:buFont typeface="Arial" panose="020B0604020202020204" pitchFamily="34" charset="0"/>
+              <a:buChar char="•"/>
+            </a:pPr>
+            <a:r>
+              <a:rPr lang="en-US" sz="2500" dirty="0" smtClean="0"/>
+              <a:t>The world can be much larger than what is shown on 	our screens</a:t>
+            </a:r>
+          </a:p>
+          <a:p>
+            <a:pPr marL="1657350" lvl="2" indent="-742950">
+              <a:buFont typeface="Arial" panose="020B0604020202020204" pitchFamily="34" charset="0"/>
+              <a:buChar char="•"/>
+            </a:pPr>
+            <a:r>
+              <a:rPr lang="en-US" sz="2500" dirty="0" smtClean="0"/>
+              <a:t>In a scrolling game, the tile mapping technique is </a:t>
+            </a:r>
+            <a:r>
+              <a:rPr lang="en-US" sz="2500" smtClean="0"/>
+              <a:t>the 	same</a:t>
+            </a:r>
+            <a:endParaRPr lang="en-US" sz="2500" dirty="0" smtClean="0"/>
+          </a:p>
+          <a:p>
+            <a:pPr marL="1657350" lvl="2" indent="-742950">
+              <a:buFont typeface="Arial" panose="020B0604020202020204" pitchFamily="34" charset="0"/>
+              <a:buChar char="•"/>
+            </a:pPr>
+            <a:r>
+              <a:rPr lang="en-US" sz="2500" dirty="0" smtClean="0"/>
+              <a:t>Except the map is bigger than the screen</a:t>
+            </a:r>
+          </a:p>
+          <a:p>
+            <a:pPr marL="1657350" lvl="2" indent="-742950">
+              <a:buFont typeface="Arial" panose="020B0604020202020204" pitchFamily="34" charset="0"/>
+              <a:buChar char="•"/>
+            </a:pPr>
+            <a:endParaRPr lang="en-US" sz="2500" dirty="0" smtClean="0"/>
+          </a:p>
+          <a:p>
+            <a:pPr marL="1657350" lvl="2" indent="-742950">
+              <a:buFont typeface="Arial" panose="020B0604020202020204" pitchFamily="34" charset="0"/>
+              <a:buChar char="•"/>
+            </a:pPr>
+            <a:endParaRPr lang="en-US" sz="2500" dirty="0" smtClean="0"/>
+          </a:p>
+        </p:txBody>
+      </p:sp>
+    </p:spTree>
+    <p:extLst>
+      <p:ext uri="{BB962C8B-B14F-4D97-AF65-F5344CB8AC3E}">
+        <p14:creationId xmlns:p14="http://schemas.microsoft.com/office/powerpoint/2010/main" val="142048772"/>
+      </p:ext>
+    </p:extLst>
+  </p:cSld>
+  <p:clrMapOvr>
+    <a:masterClrMapping/>
+  </p:clrMapOvr>
+  <p:timing>
+    <p:tnLst>
+      <p:par>
+        <p:cTn id="1" dur="indefinite" restart="never" nodeType="tmRoot"/>
+      </p:par>
+    </p:tnLst>
+  </p:timing>
+</p:sld>
+</file>
+
+<file path=ppt/slides/slide3.xml><?xml version="1.0" encoding="utf-8"?>
+<p:sld xmlns:a="http://schemas.openxmlformats.org/drawingml/2006/main" xmlns:r="http://schemas.openxmlformats.org/officeDocument/2006/relationships" xmlns:p="http://schemas.openxmlformats.org/presentationml/2006/main">
+  <p:cSld>
+    <p:spTree>
+      <p:nvGrpSpPr>
+        <p:cNvPr id="1" name=""/>
+        <p:cNvGrpSpPr/>
+        <p:nvPr/>
+      </p:nvGrpSpPr>
+      <p:grpSpPr>
+        <a:xfrm>
+          <a:off x="0" y="0"/>
+          <a:ext cx="0" cy="0"/>
+          <a:chOff x="0" y="0"/>
+          <a:chExt cx="0" cy="0"/>
+        </a:xfrm>
+      </p:grpSpPr>
+      <p:sp>
+        <p:nvSpPr>
+          <p:cNvPr id="3" name="Rectangle 2"/>
+          <p:cNvSpPr/>
+          <p:nvPr/>
+        </p:nvSpPr>
+        <p:spPr>
+          <a:xfrm>
+            <a:off x="0" y="0"/>
+            <a:ext cx="9144000" cy="1631216"/>
+          </a:xfrm>
+          <a:prstGeom prst="rect">
+            <a:avLst/>
+          </a:prstGeom>
+        </p:spPr>
+        <p:txBody>
+          <a:bodyPr wrap="square">
+            <a:spAutoFit/>
+          </a:bodyPr>
+          <a:lstStyle/>
+          <a:p>
+            <a:pPr algn="ctr"/>
+            <a:endParaRPr lang="en-US" sz="4000" b="1" dirty="0"/>
+          </a:p>
+          <a:p>
+            <a:pPr lvl="1"/>
+            <a:r>
+              <a:rPr lang="en-AU" sz="3500" b="1" dirty="0" smtClean="0"/>
+              <a:t>Scrolling</a:t>
+            </a:r>
+            <a:endParaRPr lang="en-US" sz="2500" dirty="0" smtClean="0"/>
+          </a:p>
+          <a:p>
+            <a:pPr marL="1657350" lvl="2" indent="-742950">
+              <a:buFont typeface="Arial" panose="020B0604020202020204" pitchFamily="34" charset="0"/>
+              <a:buChar char="•"/>
+            </a:pPr>
+            <a:endParaRPr lang="en-US" sz="2500" dirty="0" smtClean="0"/>
+          </a:p>
+        </p:txBody>
+      </p:sp>
+      <p:grpSp>
+        <p:nvGrpSpPr>
+          <p:cNvPr id="5" name="Group 4"/>
+          <p:cNvGrpSpPr/>
+          <p:nvPr/>
+        </p:nvGrpSpPr>
+        <p:grpSpPr>
+          <a:xfrm>
+            <a:off x="1343386" y="1631216"/>
+            <a:ext cx="6457227" cy="4697963"/>
+            <a:chOff x="1343386" y="1631216"/>
+            <a:chExt cx="6457227" cy="4697963"/>
+          </a:xfrm>
+        </p:grpSpPr>
+        <p:pic>
+          <p:nvPicPr>
+            <p:cNvPr id="4" name="Picture 3"/>
+            <p:cNvPicPr>
+              <a:picLocks noChangeAspect="1"/>
+            </p:cNvPicPr>
+            <p:nvPr/>
+          </p:nvPicPr>
+          <p:blipFill>
+            <a:blip r:embed="rId3">
+              <a:extLst>
+                <a:ext uri="{28A0092B-C50C-407E-A947-70E740481C1C}">
+                  <a14:useLocalDpi xmlns:a14="http://schemas.microsoft.com/office/drawing/2010/main" val="0"/>
+                </a:ext>
+              </a:extLst>
+            </a:blip>
+            <a:stretch>
+              <a:fillRect/>
+            </a:stretch>
+          </p:blipFill>
+          <p:spPr>
+            <a:xfrm>
+              <a:off x="1343386" y="1631216"/>
+              <a:ext cx="6457227" cy="4697963"/>
+            </a:xfrm>
+            <a:prstGeom prst="rect">
+              <a:avLst/>
+            </a:prstGeom>
+          </p:spPr>
+        </p:pic>
+        <p:sp>
+          <p:nvSpPr>
+            <p:cNvPr id="2" name="Rectangle 1"/>
+            <p:cNvSpPr/>
+            <p:nvPr/>
+          </p:nvSpPr>
+          <p:spPr>
+            <a:xfrm>
+              <a:off x="2933699" y="2957359"/>
+              <a:ext cx="3276600" cy="2057400"/>
+            </a:xfrm>
+            <a:prstGeom prst="rect">
+              <a:avLst/>
+            </a:prstGeom>
+            <a:noFill/>
+            <a:ln w="76200">
+              <a:solidFill>
+                <a:srgbClr val="FFFF00"/>
+              </a:solidFill>
+            </a:ln>
+          </p:spPr>
+          <p:style>
+            <a:lnRef idx="2">
+              <a:schemeClr val="accent1">
+                <a:shade val="50000"/>
+              </a:schemeClr>
+            </a:lnRef>
+            <a:fillRef idx="1">
+              <a:schemeClr val="accent1"/>
+            </a:fillRef>
+            <a:effectRef idx="0">
+              <a:schemeClr val="accent1"/>
+            </a:effectRef>
+            <a:fontRef idx="minor">
+              <a:schemeClr val="lt1"/>
+            </a:fontRef>
+          </p:style>
+          <p:txBody>
+            <a:bodyPr rtlCol="0" anchor="ctr"/>
+            <a:lstStyle/>
+            <a:p>
+              <a:pPr algn="ctr"/>
+              <a:endParaRPr lang="en-US"/>
+            </a:p>
+          </p:txBody>
+        </p:sp>
+      </p:grpSp>
+    </p:spTree>
+    <p:extLst>
+      <p:ext uri="{BB962C8B-B14F-4D97-AF65-F5344CB8AC3E}">
+        <p14:creationId xmlns:p14="http://schemas.microsoft.com/office/powerpoint/2010/main" val="308746993"/>
+      </p:ext>
+    </p:extLst>
+  </p:cSld>
+  <p:clrMapOvr>
+    <a:masterClrMapping/>
+  </p:clrMapOvr>
+  <p:timing>
+    <p:tnLst>
+      <p:par>
+        <p:cTn id="1" dur="indefinite" restart="never" nodeType="tmRoot"/>
+      </p:par>
+    </p:tnLst>
+  </p:timing>
+</p:sld>
+</file>
+
+<file path=ppt/slides/slide4.xml><?xml version="1.0" encoding="utf-8"?>
+<p:sld xmlns:a="http://schemas.openxmlformats.org/drawingml/2006/main" xmlns:r="http://schemas.openxmlformats.org/officeDocument/2006/relationships" xmlns:p="http://schemas.openxmlformats.org/presentationml/2006/main">
+  <p:cSld>
+    <p:spTree>
+      <p:nvGrpSpPr>
+        <p:cNvPr id="1" name=""/>
+        <p:cNvGrpSpPr/>
+        <p:nvPr/>
+      </p:nvGrpSpPr>
+      <p:grpSpPr>
+        <a:xfrm>
+          <a:off x="0" y="0"/>
+          <a:ext cx="0" cy="0"/>
+          <a:chOff x="0" y="0"/>
+          <a:chExt cx="0" cy="0"/>
+        </a:xfrm>
+      </p:grpSpPr>
+      <p:sp>
+        <p:nvSpPr>
+          <p:cNvPr id="3" name="Rectangle 2"/>
+          <p:cNvSpPr/>
+          <p:nvPr/>
+        </p:nvSpPr>
+        <p:spPr>
+          <a:xfrm>
+            <a:off x="0" y="0"/>
+            <a:ext cx="9144000" cy="3939540"/>
+          </a:xfrm>
+          <a:prstGeom prst="rect">
+            <a:avLst/>
+          </a:prstGeom>
+        </p:spPr>
+        <p:txBody>
+          <a:bodyPr wrap="square">
+            <a:spAutoFit/>
+          </a:bodyPr>
+          <a:lstStyle/>
+          <a:p>
+            <a:pPr algn="ctr"/>
+            <a:endParaRPr lang="en-US" sz="4000" b="1" dirty="0"/>
+          </a:p>
+          <a:p>
+            <a:pPr lvl="1"/>
+            <a:r>
+              <a:rPr lang="en-AU" sz="3500" b="1" dirty="0" smtClean="0"/>
+              <a:t>Example World</a:t>
+            </a:r>
+            <a:endParaRPr lang="en-US" sz="3500" b="1" dirty="0" smtClean="0"/>
+          </a:p>
+          <a:p>
+            <a:pPr marL="1657350" lvl="2" indent="-742950">
+              <a:buFont typeface="Arial" panose="020B0604020202020204" pitchFamily="34" charset="0"/>
+              <a:buChar char="•"/>
+            </a:pPr>
+            <a:endParaRPr lang="en-US" sz="2500" dirty="0" smtClean="0"/>
+          </a:p>
+          <a:p>
+            <a:pPr marL="1657350" lvl="2" indent="-742950">
+              <a:buFont typeface="Arial" panose="020B0604020202020204" pitchFamily="34" charset="0"/>
+              <a:buChar char="•"/>
+            </a:pPr>
+            <a:r>
+              <a:rPr lang="en-US" sz="2500" dirty="0" smtClean="0"/>
+              <a:t>Super Mario Bros (NES) </a:t>
+            </a:r>
+          </a:p>
+          <a:p>
+            <a:pPr marL="1657350" lvl="2" indent="-742950">
+              <a:buFont typeface="Arial" panose="020B0604020202020204" pitchFamily="34" charset="0"/>
+              <a:buChar char="•"/>
+            </a:pPr>
+            <a:r>
+              <a:rPr lang="en-US" sz="2500" dirty="0" smtClean="0"/>
+              <a:t>SMB uses 16x16 pixel tiles </a:t>
+            </a:r>
+          </a:p>
+          <a:p>
+            <a:pPr marL="1657350" lvl="2" indent="-742950">
+              <a:buFont typeface="Arial" panose="020B0604020202020204" pitchFamily="34" charset="0"/>
+              <a:buChar char="•"/>
+            </a:pPr>
+            <a:r>
+              <a:rPr lang="en-US" sz="2500" dirty="0" smtClean="0"/>
+              <a:t>SMB uses a world that is very wide, but only one </a:t>
+            </a:r>
+          </a:p>
+          <a:p>
+            <a:pPr marL="1657350" lvl="2" indent="-742950">
+              <a:buFont typeface="Arial" panose="020B0604020202020204" pitchFamily="34" charset="0"/>
+              <a:buChar char="•"/>
+            </a:pPr>
+            <a:r>
+              <a:rPr lang="en-US" sz="2500" dirty="0" smtClean="0"/>
+              <a:t>screen high</a:t>
+            </a:r>
+            <a:endParaRPr lang="en-US" sz="2500" dirty="0" smtClean="0"/>
+          </a:p>
+          <a:p>
+            <a:pPr marL="1657350" lvl="2" indent="-742950">
+              <a:buFont typeface="Arial" panose="020B0604020202020204" pitchFamily="34" charset="0"/>
+              <a:buChar char="•"/>
+            </a:pPr>
+            <a:endParaRPr lang="en-US" sz="2500" dirty="0" smtClean="0"/>
+          </a:p>
+          <a:p>
+            <a:pPr marL="1657350" lvl="2" indent="-742950">
+              <a:buFont typeface="Arial" panose="020B0604020202020204" pitchFamily="34" charset="0"/>
+              <a:buChar char="•"/>
+            </a:pPr>
+            <a:endParaRPr lang="en-US" sz="2500" dirty="0" smtClean="0"/>
+          </a:p>
+        </p:txBody>
+      </p:sp>
+    </p:spTree>
+    <p:extLst>
+      <p:ext uri="{BB962C8B-B14F-4D97-AF65-F5344CB8AC3E}">
+        <p14:creationId xmlns:p14="http://schemas.microsoft.com/office/powerpoint/2010/main" val="1119965655"/>
+      </p:ext>
+    </p:extLst>
+  </p:cSld>
+  <p:clrMapOvr>
+    <a:masterClrMapping/>
+  </p:clrMapOvr>
+  <p:timing>
+    <p:tnLst>
+      <p:par>
+        <p:cTn id="1" dur="indefinite" restart="never" nodeType="tmRoot"/>
+      </p:par>
+    </p:tnLst>
+  </p:timing>
 </p:sld>
 </file>
 
@@ -3524,4 +4558,265 @@
   <a:objectDefaults/>
   <a:extraClrSchemeLst/>
 </a:theme>
+</file>
+
+<file path=ppt/theme/theme2.xml><?xml version="1.0" encoding="utf-8"?>
+<a:theme xmlns:a="http://schemas.openxmlformats.org/drawingml/2006/main" name="Office Theme">
+  <a:themeElements>
+    <a:clrScheme name="Office">
+      <a:dk1>
+        <a:sysClr val="windowText" lastClr="000000"/>
+      </a:dk1>
+      <a:lt1>
+        <a:sysClr val="window" lastClr="FFFFFF"/>
+      </a:lt1>
+      <a:dk2>
+        <a:srgbClr val="44546A"/>
+      </a:dk2>
+      <a:lt2>
+        <a:srgbClr val="E7E6E6"/>
+      </a:lt2>
+      <a:accent1>
+        <a:srgbClr val="4472C4"/>
+      </a:accent1>
+      <a:accent2>
+        <a:srgbClr val="ED7D31"/>
+      </a:accent2>
+      <a:accent3>
+        <a:srgbClr val="A5A5A5"/>
+      </a:accent3>
+      <a:accent4>
+        <a:srgbClr val="FFC000"/>
+      </a:accent4>
+      <a:accent5>
+        <a:srgbClr val="5B9BD5"/>
+      </a:accent5>
+      <a:accent6>
+        <a:srgbClr val="70AD47"/>
+      </a:accent6>
+      <a:hlink>
+        <a:srgbClr val="0563C1"/>
+      </a:hlink>
+      <a:folHlink>
+        <a:srgbClr val="954F72"/>
+      </a:folHlink>
+    </a:clrScheme>
+    <a:fontScheme name="Office">
+      <a:majorFont>
+        <a:latin typeface="Calibri Light" panose="020F0302020204030204"/>
+        <a:ea typeface=""/>
+        <a:cs typeface=""/>
+        <a:font script="Jpan" typeface="Yu Gothic Light"/>
+        <a:font script="Hang" typeface="맑은 고딕"/>
+        <a:font script="Hans" typeface="DengXian Light"/>
+        <a:font script="Hant" typeface="新細明體"/>
+        <a:font script="Arab" typeface="Times New Roman"/>
+        <a:font script="Hebr" typeface="Times New Roman"/>
+        <a:font script="Thai" typeface="Angsana New"/>
+        <a:font script="Ethi" typeface="Nyala"/>
+        <a:font script="Beng" typeface="Vrinda"/>
+        <a:font script="Gujr" typeface="Shruti"/>
+        <a:font script="Khmr" typeface="MoolBoran"/>
+        <a:font script="Knda" typeface="Tunga"/>
+        <a:font script="Guru" typeface="Raavi"/>
+        <a:font script="Cans" typeface="Euphemia"/>
+        <a:font script="Cher" typeface="Plantagenet Cherokee"/>
+        <a:font script="Yiii" typeface="Microsoft Yi Baiti"/>
+        <a:font script="Tibt" typeface="Microsoft Himalaya"/>
+        <a:font script="Thaa" typeface="MV Boli"/>
+        <a:font script="Deva" typeface="Mangal"/>
+        <a:font script="Telu" typeface="Gautami"/>
+        <a:font script="Taml" typeface="Latha"/>
+        <a:font script="Syrc" typeface="Estrangelo Edessa"/>
+        <a:font script="Orya" typeface="Kalinga"/>
+        <a:font script="Mlym" typeface="Kartika"/>
+        <a:font script="Laoo" typeface="DokChampa"/>
+        <a:font script="Sinh" typeface="Iskoola Pota"/>
+        <a:font script="Mong" typeface="Mongolian Baiti"/>
+        <a:font script="Viet" typeface="Times New Roman"/>
+        <a:font script="Uigh" typeface="Microsoft Uighur"/>
+        <a:font script="Geor" typeface="Sylfaen"/>
+      </a:majorFont>
+      <a:minorFont>
+        <a:latin typeface="Calibri" panose="020F0502020204030204"/>
+        <a:ea typeface=""/>
+        <a:cs typeface=""/>
+        <a:font script="Jpan" typeface="Yu Gothic"/>
+        <a:font script="Hang" typeface="맑은 고딕"/>
+        <a:font script="Hans" typeface="DengXian"/>
+        <a:font script="Hant" typeface="新細明體"/>
+        <a:font script="Arab" typeface="Arial"/>
+        <a:font script="Hebr" typeface="Arial"/>
+        <a:font script="Thai" typeface="Cordia New"/>
+        <a:font script="Ethi" typeface="Nyala"/>
+        <a:font script="Beng" typeface="Vrinda"/>
+        <a:font script="Gujr" typeface="Shruti"/>
+        <a:font script="Khmr" typeface="DaunPenh"/>
+        <a:font script="Knda" typeface="Tunga"/>
+        <a:font script="Guru" typeface="Raavi"/>
+        <a:font script="Cans" typeface="Euphemia"/>
+        <a:font script="Cher" typeface="Plantagenet Cherokee"/>
+        <a:font script="Yiii" typeface="Microsoft Yi Baiti"/>
+        <a:font script="Tibt" typeface="Microsoft Himalaya"/>
+        <a:font script="Thaa" typeface="MV Boli"/>
+        <a:font script="Deva" typeface="Mangal"/>
+        <a:font script="Telu" typeface="Gautami"/>
+        <a:font script="Taml" typeface="Latha"/>
+        <a:font script="Syrc" typeface="Estrangelo Edessa"/>
+        <a:font script="Orya" typeface="Kalinga"/>
+        <a:font script="Mlym" typeface="Kartika"/>
+        <a:font script="Laoo" typeface="DokChampa"/>
+        <a:font script="Sinh" typeface="Iskoola Pota"/>
+        <a:font script="Mong" typeface="Mongolian Baiti"/>
+        <a:font script="Viet" typeface="Arial"/>
+        <a:font script="Uigh" typeface="Microsoft Uighur"/>
+        <a:font script="Geor" typeface="Sylfaen"/>
+      </a:minorFont>
+    </a:fontScheme>
+    <a:fmtScheme name="Office">
+      <a:fillStyleLst>
+        <a:solidFill>
+          <a:schemeClr val="phClr"/>
+        </a:solidFill>
+        <a:gradFill rotWithShape="1">
+          <a:gsLst>
+            <a:gs pos="0">
+              <a:schemeClr val="phClr">
+                <a:lumMod val="110000"/>
+                <a:satMod val="105000"/>
+                <a:tint val="67000"/>
+              </a:schemeClr>
+            </a:gs>
+            <a:gs pos="50000">
+              <a:schemeClr val="phClr">
+                <a:lumMod val="105000"/>
+                <a:satMod val="103000"/>
+                <a:tint val="73000"/>
+              </a:schemeClr>
+            </a:gs>
+            <a:gs pos="100000">
+              <a:schemeClr val="phClr">
+                <a:lumMod val="105000"/>
+                <a:satMod val="109000"/>
+                <a:tint val="81000"/>
+              </a:schemeClr>
+            </a:gs>
+          </a:gsLst>
+          <a:lin ang="5400000" scaled="0"/>
+        </a:gradFill>
+        <a:gradFill rotWithShape="1">
+          <a:gsLst>
+            <a:gs pos="0">
+              <a:schemeClr val="phClr">
+                <a:satMod val="103000"/>
+                <a:lumMod val="102000"/>
+                <a:tint val="94000"/>
+              </a:schemeClr>
+            </a:gs>
+            <a:gs pos="50000">
+              <a:schemeClr val="phClr">
+                <a:satMod val="110000"/>
+                <a:lumMod val="100000"/>
+                <a:shade val="100000"/>
+              </a:schemeClr>
+            </a:gs>
+            <a:gs pos="100000">
+              <a:schemeClr val="phClr">
+                <a:lumMod val="99000"/>
+                <a:satMod val="120000"/>
+                <a:shade val="78000"/>
+              </a:schemeClr>
+            </a:gs>
+          </a:gsLst>
+          <a:lin ang="5400000" scaled="0"/>
+        </a:gradFill>
+      </a:fillStyleLst>
+      <a:lnStyleLst>
+        <a:ln w="6350" cap="flat" cmpd="sng" algn="ctr">
+          <a:solidFill>
+            <a:schemeClr val="phClr"/>
+          </a:solidFill>
+          <a:prstDash val="solid"/>
+          <a:miter lim="800000"/>
+        </a:ln>
+        <a:ln w="12700" cap="flat" cmpd="sng" algn="ctr">
+          <a:solidFill>
+            <a:schemeClr val="phClr"/>
+          </a:solidFill>
+          <a:prstDash val="solid"/>
+          <a:miter lim="800000"/>
+        </a:ln>
+        <a:ln w="19050" cap="flat" cmpd="sng" algn="ctr">
+          <a:solidFill>
+            <a:schemeClr val="phClr"/>
+          </a:solidFill>
+          <a:prstDash val="solid"/>
+          <a:miter lim="800000"/>
+        </a:ln>
+      </a:lnStyleLst>
+      <a:effectStyleLst>
+        <a:effectStyle>
+          <a:effectLst/>
+        </a:effectStyle>
+        <a:effectStyle>
+          <a:effectLst/>
+        </a:effectStyle>
+        <a:effectStyle>
+          <a:effectLst>
+            <a:outerShdw blurRad="57150" dist="19050" dir="5400000" algn="ctr" rotWithShape="0">
+              <a:srgbClr val="000000">
+                <a:alpha val="63000"/>
+              </a:srgbClr>
+            </a:outerShdw>
+          </a:effectLst>
+        </a:effectStyle>
+      </a:effectStyleLst>
+      <a:bgFillStyleLst>
+        <a:solidFill>
+          <a:schemeClr val="phClr"/>
+        </a:solidFill>
+        <a:solidFill>
+          <a:schemeClr val="phClr">
+            <a:tint val="95000"/>
+            <a:satMod val="170000"/>
+          </a:schemeClr>
+        </a:solidFill>
+        <a:gradFill rotWithShape="1">
+          <a:gsLst>
+            <a:gs pos="0">
+              <a:schemeClr val="phClr">
+                <a:tint val="93000"/>
+                <a:satMod val="150000"/>
+                <a:shade val="98000"/>
+                <a:lumMod val="102000"/>
+              </a:schemeClr>
+            </a:gs>
+            <a:gs pos="50000">
+              <a:schemeClr val="phClr">
+                <a:tint val="98000"/>
+                <a:satMod val="130000"/>
+                <a:shade val="90000"/>
+                <a:lumMod val="103000"/>
+              </a:schemeClr>
+            </a:gs>
+            <a:gs pos="100000">
+              <a:schemeClr val="phClr">
+                <a:shade val="63000"/>
+                <a:satMod val="120000"/>
+              </a:schemeClr>
+            </a:gs>
+          </a:gsLst>
+          <a:lin ang="5400000" scaled="0"/>
+        </a:gradFill>
+      </a:bgFillStyleLst>
+    </a:fmtScheme>
+  </a:themeElements>
+  <a:objectDefaults/>
+  <a:extraClrSchemeLst/>
+  <a:extLst>
+    <a:ext uri="{05A4C25C-085E-4340-85A3-A5531E510DB2}">
+      <thm15:themeFamily xmlns:thm15="http://schemas.microsoft.com/office/thememl/2012/main" name="Office Theme" id="{62F939B6-93AF-4DB8-9C6B-D6C7DFDC589F}" vid="{4A3C46E8-61CC-4603-A589-7422A47A8E4A}"/>
+    </a:ext>
+  </a:extLst>
+</a:theme>
 </file>
</xml_diff>

<commit_message>
Update PP and practical
</commit_message>
<xml_diff>
--- a/Programming 4/07.1 Manual Scrolling Tile Map/07.1 Manual Scrolling Tile Map.pptx
+++ b/Programming 4/07.1 Manual Scrolling Tile Map/07.1 Manual Scrolling Tile Map.pptx
@@ -5,7 +5,7 @@
     <p:sldMasterId id="2147483648" r:id="rId1"/>
   </p:sldMasterIdLst>
   <p:notesMasterIdLst>
-    <p:notesMasterId r:id="rId22"/>
+    <p:notesMasterId r:id="rId23"/>
   </p:notesMasterIdLst>
   <p:sldIdLst>
     <p:sldId id="256" r:id="rId2"/>
@@ -27,7 +27,8 @@
     <p:sldId id="272" r:id="rId18"/>
     <p:sldId id="273" r:id="rId19"/>
     <p:sldId id="274" r:id="rId20"/>
-    <p:sldId id="275" r:id="rId21"/>
+    <p:sldId id="276" r:id="rId21"/>
+    <p:sldId id="275" r:id="rId22"/>
   </p:sldIdLst>
   <p:sldSz cx="9144000" cy="6858000" type="screen4x3"/>
   <p:notesSz cx="6858000" cy="9144000"/>
@@ -227,7 +228,7 @@
           <a:p>
             <a:fld id="{5A5D9C48-5678-9443-958E-9EAAE3ED0F2B}" type="datetimeFigureOut">
               <a:rPr lang="en-US" smtClean="0"/>
-              <a:t>9/2/19</a:t>
+              <a:t>9/3/2019</a:t>
             </a:fld>
             <a:endParaRPr lang="en-US"/>
           </a:p>
@@ -1453,7 +1454,7 @@
     </p:spTree>
     <p:extLst>
       <p:ext uri="{BB962C8B-B14F-4D97-AF65-F5344CB8AC3E}">
-        <p14:creationId xmlns:p14="http://schemas.microsoft.com/office/powerpoint/2010/main" val="983805020"/>
+        <p14:creationId xmlns:p14="http://schemas.microsoft.com/office/powerpoint/2010/main" val="204873361"/>
       </p:ext>
     </p:extLst>
   </p:cSld>
@@ -1542,6 +1543,94 @@
     <p:extLst>
       <p:ext uri="{BB962C8B-B14F-4D97-AF65-F5344CB8AC3E}">
         <p14:creationId xmlns:p14="http://schemas.microsoft.com/office/powerpoint/2010/main" val="790220199"/>
+      </p:ext>
+    </p:extLst>
+  </p:cSld>
+  <p:clrMapOvr>
+    <a:masterClrMapping/>
+  </p:clrMapOvr>
+</p:notes>
+</file>
+
+<file path=ppt/notesSlides/notesSlide20.xml><?xml version="1.0" encoding="utf-8"?>
+<p:notes xmlns:a="http://schemas.openxmlformats.org/drawingml/2006/main" xmlns:r="http://schemas.openxmlformats.org/officeDocument/2006/relationships" xmlns:p="http://schemas.openxmlformats.org/presentationml/2006/main">
+  <p:cSld>
+    <p:spTree>
+      <p:nvGrpSpPr>
+        <p:cNvPr id="1" name=""/>
+        <p:cNvGrpSpPr/>
+        <p:nvPr/>
+      </p:nvGrpSpPr>
+      <p:grpSpPr>
+        <a:xfrm>
+          <a:off x="0" y="0"/>
+          <a:ext cx="0" cy="0"/>
+          <a:chOff x="0" y="0"/>
+          <a:chExt cx="0" cy="0"/>
+        </a:xfrm>
+      </p:grpSpPr>
+      <p:sp>
+        <p:nvSpPr>
+          <p:cNvPr id="2" name="Slide Image Placeholder 1"/>
+          <p:cNvSpPr>
+            <a:spLocks noGrp="1" noRot="1" noChangeAspect="1"/>
+          </p:cNvSpPr>
+          <p:nvPr>
+            <p:ph type="sldImg"/>
+          </p:nvPr>
+        </p:nvSpPr>
+        <p:spPr/>
+      </p:sp>
+      <p:sp>
+        <p:nvSpPr>
+          <p:cNvPr id="3" name="Notes Placeholder 2"/>
+          <p:cNvSpPr>
+            <a:spLocks noGrp="1"/>
+          </p:cNvSpPr>
+          <p:nvPr>
+            <p:ph type="body" idx="1"/>
+          </p:nvPr>
+        </p:nvSpPr>
+        <p:spPr/>
+        <p:txBody>
+          <a:bodyPr/>
+          <a:lstStyle/>
+          <a:p>
+            <a:pPr marL="171450" indent="-171450">
+              <a:buFont typeface="Arial" panose="020B0604020202020204" pitchFamily="34" charset="0"/>
+              <a:buChar char="•"/>
+            </a:pPr>
+            <a:endParaRPr lang="en-NZ" dirty="0" smtClean="0"/>
+          </a:p>
+        </p:txBody>
+      </p:sp>
+      <p:sp>
+        <p:nvSpPr>
+          <p:cNvPr id="4" name="Slide Number Placeholder 3"/>
+          <p:cNvSpPr>
+            <a:spLocks noGrp="1"/>
+          </p:cNvSpPr>
+          <p:nvPr>
+            <p:ph type="sldNum" sz="quarter" idx="10"/>
+          </p:nvPr>
+        </p:nvSpPr>
+        <p:spPr/>
+        <p:txBody>
+          <a:bodyPr/>
+          <a:lstStyle/>
+          <a:p>
+            <a:fld id="{BBC1DE02-C006-4F38-873D-E62701AB1734}" type="slidenum">
+              <a:rPr lang="en-NZ" smtClean="0"/>
+              <a:t>21</a:t>
+            </a:fld>
+            <a:endParaRPr lang="en-NZ"/>
+          </a:p>
+        </p:txBody>
+      </p:sp>
+    </p:spTree>
+    <p:extLst>
+      <p:ext uri="{BB962C8B-B14F-4D97-AF65-F5344CB8AC3E}">
+        <p14:creationId xmlns:p14="http://schemas.microsoft.com/office/powerpoint/2010/main" val="983805020"/>
       </p:ext>
     </p:extLst>
   </p:cSld>
@@ -2380,7 +2469,7 @@
           <a:p>
             <a:fld id="{F8166F1F-CE9B-4651-A6AA-CD717754106B}" type="datetimeFigureOut">
               <a:rPr lang="en-US" smtClean="0"/>
-              <a:t>9/2/19</a:t>
+              <a:t>9/3/2019</a:t>
             </a:fld>
             <a:endParaRPr lang="en-US"/>
           </a:p>
@@ -2545,7 +2634,7 @@
           <a:p>
             <a:fld id="{A76116CE-C4A3-4A05-B2D7-7C2E9A889C0F}" type="datetimeFigureOut">
               <a:rPr lang="en-US" smtClean="0"/>
-              <a:t>9/2/19</a:t>
+              <a:t>9/3/2019</a:t>
             </a:fld>
             <a:endParaRPr lang="en-US"/>
           </a:p>
@@ -2720,7 +2809,7 @@
           <a:p>
             <a:fld id="{A76116CE-C4A3-4A05-B2D7-7C2E9A889C0F}" type="datetimeFigureOut">
               <a:rPr lang="en-US" smtClean="0"/>
-              <a:t>9/2/19</a:t>
+              <a:t>9/3/2019</a:t>
             </a:fld>
             <a:endParaRPr lang="en-US"/>
           </a:p>
@@ -2887,7 +2976,7 @@
           <a:p>
             <a:fld id="{A76116CE-C4A3-4A05-B2D7-7C2E9A889C0F}" type="datetimeFigureOut">
               <a:rPr lang="en-US" smtClean="0"/>
-              <a:t>9/2/19</a:t>
+              <a:t>9/3/2019</a:t>
             </a:fld>
             <a:endParaRPr lang="en-US"/>
           </a:p>
@@ -3128,7 +3217,7 @@
           <a:p>
             <a:fld id="{A76116CE-C4A3-4A05-B2D7-7C2E9A889C0F}" type="datetimeFigureOut">
               <a:rPr lang="en-US" smtClean="0"/>
-              <a:t>9/2/19</a:t>
+              <a:t>9/3/2019</a:t>
             </a:fld>
             <a:endParaRPr lang="en-US"/>
           </a:p>
@@ -3411,7 +3500,7 @@
           <a:p>
             <a:fld id="{A76116CE-C4A3-4A05-B2D7-7C2E9A889C0F}" type="datetimeFigureOut">
               <a:rPr lang="en-US" smtClean="0"/>
-              <a:t>9/2/19</a:t>
+              <a:t>9/3/2019</a:t>
             </a:fld>
             <a:endParaRPr lang="en-US"/>
           </a:p>
@@ -3828,7 +3917,7 @@
           <a:p>
             <a:fld id="{A76116CE-C4A3-4A05-B2D7-7C2E9A889C0F}" type="datetimeFigureOut">
               <a:rPr lang="en-US" smtClean="0"/>
-              <a:t>9/2/19</a:t>
+              <a:t>9/3/2019</a:t>
             </a:fld>
             <a:endParaRPr lang="en-US"/>
           </a:p>
@@ -3941,7 +4030,7 @@
           <a:p>
             <a:fld id="{A76116CE-C4A3-4A05-B2D7-7C2E9A889C0F}" type="datetimeFigureOut">
               <a:rPr lang="en-US" smtClean="0"/>
-              <a:t>9/2/19</a:t>
+              <a:t>9/3/2019</a:t>
             </a:fld>
             <a:endParaRPr lang="en-US"/>
           </a:p>
@@ -4031,7 +4120,7 @@
           <a:p>
             <a:fld id="{A76116CE-C4A3-4A05-B2D7-7C2E9A889C0F}" type="datetimeFigureOut">
               <a:rPr lang="en-US" smtClean="0"/>
-              <a:t>9/2/19</a:t>
+              <a:t>9/3/2019</a:t>
             </a:fld>
             <a:endParaRPr lang="en-US"/>
           </a:p>
@@ -4303,7 +4392,7 @@
           <a:p>
             <a:fld id="{A76116CE-C4A3-4A05-B2D7-7C2E9A889C0F}" type="datetimeFigureOut">
               <a:rPr lang="en-US" smtClean="0"/>
-              <a:t>9/2/19</a:t>
+              <a:t>9/3/2019</a:t>
             </a:fld>
             <a:endParaRPr lang="en-US"/>
           </a:p>
@@ -4551,7 +4640,7 @@
           <a:p>
             <a:fld id="{A76116CE-C4A3-4A05-B2D7-7C2E9A889C0F}" type="datetimeFigureOut">
               <a:rPr lang="en-US" smtClean="0"/>
-              <a:t>9/2/19</a:t>
+              <a:t>9/3/2019</a:t>
             </a:fld>
             <a:endParaRPr lang="en-US"/>
           </a:p>
@@ -4759,7 +4848,7 @@
           <a:p>
             <a:fld id="{F8166F1F-CE9B-4651-A6AA-CD717754106B}" type="datetimeFigureOut">
               <a:rPr lang="en-US" smtClean="0"/>
-              <a:t>9/2/19</a:t>
+              <a:t>9/3/2019</a:t>
             </a:fld>
             <a:endParaRPr lang="en-US"/>
           </a:p>
@@ -5422,6 +5511,36 @@
           </a:p>
         </p:txBody>
       </p:sp>
+      <p:pic>
+        <p:nvPicPr>
+          <p:cNvPr id="2" name="Picture 1"/>
+          <p:cNvPicPr>
+            <a:picLocks noChangeAspect="1"/>
+          </p:cNvPicPr>
+          <p:nvPr/>
+        </p:nvPicPr>
+        <p:blipFill>
+          <a:blip r:embed="rId3">
+            <a:extLst>
+              <a:ext uri="{28A0092B-C50C-407E-A947-70E740481C1C}">
+                <a14:useLocalDpi xmlns:a14="http://schemas.microsoft.com/office/drawing/2010/main" val="0"/>
+              </a:ext>
+            </a:extLst>
+          </a:blip>
+          <a:stretch>
+            <a:fillRect/>
+          </a:stretch>
+        </p:blipFill>
+        <p:spPr>
+          <a:xfrm>
+            <a:off x="1243012" y="1676400"/>
+            <a:ext cx="6657975" cy="3086100"/>
+          </a:xfrm>
+          <a:prstGeom prst="rect">
+            <a:avLst/>
+          </a:prstGeom>
+        </p:spPr>
+      </p:pic>
     </p:spTree>
     <p:extLst>
       <p:ext uri="{BB962C8B-B14F-4D97-AF65-F5344CB8AC3E}">
@@ -5568,7 +5687,6 @@
               <a:rPr lang="en-US" sz="2000" dirty="0" smtClean="0"/>
               <a:t>Figure out where to draw it on the canvas</a:t>
             </a:r>
-            <a:endParaRPr lang="en-US" sz="2000" dirty="0" smtClean="0"/>
           </a:p>
         </p:txBody>
       </p:sp>
@@ -5629,7 +5747,7 @@
         <p:spPr>
           <a:xfrm>
             <a:off x="0" y="0"/>
-            <a:ext cx="9144000" cy="2015936"/>
+            <a:ext cx="9144000" cy="3939540"/>
           </a:xfrm>
           <a:prstGeom prst="rect">
             <a:avLst/>
@@ -5658,6 +5776,67 @@
               <a:buChar char="•"/>
             </a:pPr>
             <a:endParaRPr lang="en-US" sz="2500" dirty="0" smtClean="0"/>
+          </a:p>
+          <a:p>
+            <a:pPr marL="1657350" lvl="2" indent="-742950">
+              <a:buFont typeface="Arial" panose="020B0604020202020204" pitchFamily="34" charset="0"/>
+              <a:buChar char="•"/>
+            </a:pPr>
+            <a:r>
+              <a:rPr lang="en-US" sz="2500" dirty="0" smtClean="0"/>
+              <a:t>Pseudocode:</a:t>
+            </a:r>
+          </a:p>
+          <a:p>
+            <a:pPr marL="1657350" lvl="2" indent="-742950">
+              <a:buFont typeface="Arial" panose="020B0604020202020204" pitchFamily="34" charset="0"/>
+              <a:buChar char="•"/>
+            </a:pPr>
+            <a:r>
+              <a:rPr lang="en-US" sz="2000" dirty="0" smtClean="0"/>
+              <a:t>For all rows r of the Viewport (in the world)</a:t>
+            </a:r>
+          </a:p>
+          <a:p>
+            <a:pPr marL="2114550" lvl="3" indent="-742950">
+              <a:buFont typeface="Arial" panose="020B0604020202020204" pitchFamily="34" charset="0"/>
+              <a:buChar char="•"/>
+            </a:pPr>
+            <a:r>
+              <a:rPr lang="en-US" sz="2000" dirty="0" smtClean="0"/>
+              <a:t>For all the columns c of the Viewport (in the world)</a:t>
+            </a:r>
+          </a:p>
+          <a:p>
+            <a:pPr marL="2571750" lvl="4" indent="-742950">
+              <a:buFont typeface="Arial" panose="020B0604020202020204" pitchFamily="34" charset="0"/>
+              <a:buChar char="•"/>
+            </a:pPr>
+            <a:r>
+              <a:rPr lang="en-US" sz="2000" dirty="0" smtClean="0"/>
+              <a:t>Get the bitmap for the tile at (r, c) in the world TileMap</a:t>
+            </a:r>
+          </a:p>
+          <a:p>
+            <a:pPr marL="2571750" lvl="4" indent="-742950">
+              <a:buFont typeface="Arial" panose="020B0604020202020204" pitchFamily="34" charset="0"/>
+              <a:buChar char="•"/>
+            </a:pPr>
+            <a:r>
+              <a:rPr lang="en-US" sz="2000" dirty="0" smtClean="0"/>
+              <a:t>Figure out where it goes on the screen</a:t>
+            </a:r>
+          </a:p>
+          <a:p>
+            <a:pPr marL="2571750" lvl="4" indent="-742950">
+              <a:buFont typeface="Arial" panose="020B0604020202020204" pitchFamily="34" charset="0"/>
+              <a:buChar char="•"/>
+            </a:pPr>
+            <a:r>
+              <a:rPr lang="en-US" sz="2000" dirty="0" smtClean="0"/>
+              <a:t>Draw it there</a:t>
+            </a:r>
+            <a:endParaRPr lang="en-US" sz="2000" dirty="0" smtClean="0"/>
           </a:p>
           <a:p>
             <a:pPr marL="1657350" lvl="2" indent="-742950">
@@ -5725,7 +5904,7 @@
         <p:spPr>
           <a:xfrm>
             <a:off x="0" y="0"/>
-            <a:ext cx="9144000" cy="2015936"/>
+            <a:ext cx="9144000" cy="5940088"/>
           </a:xfrm>
           <a:prstGeom prst="rect">
             <a:avLst/>
@@ -5754,6 +5933,99 @@
               <a:buChar char="•"/>
             </a:pPr>
             <a:endParaRPr lang="en-US" sz="2500" dirty="0" smtClean="0"/>
+          </a:p>
+          <a:p>
+            <a:pPr marL="1657350" lvl="2" indent="-742950">
+              <a:buFont typeface="Arial" panose="020B0604020202020204" pitchFamily="34" charset="0"/>
+              <a:buChar char="•"/>
+            </a:pPr>
+            <a:r>
+              <a:rPr lang="en-US" sz="2500" dirty="0" smtClean="0"/>
+              <a:t>The world has two units of measurement for location:</a:t>
+            </a:r>
+          </a:p>
+          <a:p>
+            <a:pPr marL="2114550" lvl="3" indent="-742950">
+              <a:buFont typeface="Arial" panose="020B0604020202020204" pitchFamily="34" charset="0"/>
+              <a:buChar char="•"/>
+            </a:pPr>
+            <a:r>
+              <a:rPr lang="en-US" sz="2000" dirty="0"/>
+              <a:t>Pixel locations – e.g. Sprite and Viewport upper left corner positions</a:t>
+            </a:r>
+          </a:p>
+          <a:p>
+            <a:pPr marL="2114550" lvl="3" indent="-742950">
+              <a:buFont typeface="Arial" panose="020B0604020202020204" pitchFamily="34" charset="0"/>
+              <a:buChar char="•"/>
+            </a:pPr>
+            <a:r>
+              <a:rPr lang="en-US" sz="2000" dirty="0"/>
+              <a:t>Row, column locations – tiles in the tile map </a:t>
+            </a:r>
+            <a:r>
+              <a:rPr lang="en-US" sz="2000" dirty="0" smtClean="0"/>
+              <a:t>background</a:t>
+            </a:r>
+            <a:endParaRPr lang="en-US" sz="2500" dirty="0" smtClean="0"/>
+          </a:p>
+          <a:p>
+            <a:pPr marL="1657350" lvl="2" indent="-742950">
+              <a:buFont typeface="Arial" panose="020B0604020202020204" pitchFamily="34" charset="0"/>
+              <a:buChar char="•"/>
+            </a:pPr>
+            <a:r>
+              <a:rPr lang="en-US" sz="2500" dirty="0" smtClean="0"/>
+              <a:t>The Viewport stores the pixel location of its upper </a:t>
+            </a:r>
+          </a:p>
+          <a:p>
+            <a:pPr lvl="2"/>
+            <a:r>
+              <a:rPr lang="en-US" sz="2500" dirty="0" smtClean="0"/>
+              <a:t>	left corner</a:t>
+            </a:r>
+          </a:p>
+          <a:p>
+            <a:pPr marL="1657350" lvl="2" indent="-742950">
+              <a:buFont typeface="Arial" panose="020B0604020202020204" pitchFamily="34" charset="0"/>
+              <a:buChar char="•"/>
+            </a:pPr>
+            <a:r>
+              <a:rPr lang="en-US" sz="2500" dirty="0" smtClean="0"/>
+              <a:t>We need the tile location of the Viewport’s upper </a:t>
+            </a:r>
+          </a:p>
+          <a:p>
+            <a:pPr lvl="2"/>
+            <a:r>
+              <a:rPr lang="en-US" sz="2500" dirty="0" smtClean="0"/>
+              <a:t>	left corner</a:t>
+            </a:r>
+          </a:p>
+          <a:p>
+            <a:pPr marL="1657350" lvl="2" indent="-742950">
+              <a:buFont typeface="Arial" panose="020B0604020202020204" pitchFamily="34" charset="0"/>
+              <a:buChar char="•"/>
+            </a:pPr>
+            <a:r>
+              <a:rPr lang="en-US" sz="2500" dirty="0" smtClean="0"/>
+              <a:t>We must translate from pixel (x, y) location to tile </a:t>
+            </a:r>
+          </a:p>
+          <a:p>
+            <a:pPr lvl="2"/>
+            <a:r>
+              <a:rPr lang="en-US" sz="2500" dirty="0" smtClean="0"/>
+              <a:t>	map (row, column) location</a:t>
+            </a:r>
+          </a:p>
+          <a:p>
+            <a:pPr marL="2114550" lvl="3" indent="-742950">
+              <a:buFont typeface="Arial" panose="020B0604020202020204" pitchFamily="34" charset="0"/>
+              <a:buChar char="•"/>
+            </a:pPr>
+            <a:endParaRPr lang="en-US" sz="2000" dirty="0" smtClean="0"/>
           </a:p>
           <a:p>
             <a:pPr marL="1657350" lvl="2" indent="-742950">
@@ -5821,7 +6093,7 @@
         <p:spPr>
           <a:xfrm>
             <a:off x="0" y="0"/>
-            <a:ext cx="9144000" cy="2015936"/>
+            <a:ext cx="9144000" cy="3554819"/>
           </a:xfrm>
           <a:prstGeom prst="rect">
             <a:avLst/>
@@ -5856,7 +6128,109 @@
               <a:buFont typeface="Arial" panose="020B0604020202020204" pitchFamily="34" charset="0"/>
               <a:buChar char="•"/>
             </a:pPr>
-            <a:endParaRPr lang="en-US" sz="2500" dirty="0" smtClean="0"/>
+            <a:r>
+              <a:rPr lang="en-US" sz="2500" dirty="0" smtClean="0"/>
+              <a:t>If an object is at pixel location </a:t>
+            </a:r>
+            <a:r>
+              <a:rPr lang="en-US" sz="2500" dirty="0" err="1" smtClean="0"/>
+              <a:t>pixelX</a:t>
+            </a:r>
+            <a:r>
+              <a:rPr lang="en-US" sz="2500" dirty="0" smtClean="0"/>
+              <a:t>, </a:t>
+            </a:r>
+            <a:r>
+              <a:rPr lang="en-US" sz="2500" dirty="0" err="1" smtClean="0"/>
+              <a:t>pixelY</a:t>
+            </a:r>
+            <a:r>
+              <a:rPr lang="en-US" sz="2500" dirty="0" smtClean="0"/>
+              <a:t>, what </a:t>
+            </a:r>
+          </a:p>
+          <a:p>
+            <a:pPr lvl="2"/>
+            <a:r>
+              <a:rPr lang="en-US" sz="2500" dirty="0" smtClean="0"/>
+              <a:t>	is its row, column location?</a:t>
+            </a:r>
+          </a:p>
+          <a:p>
+            <a:pPr marL="1657350" lvl="2" indent="-742950">
+              <a:buFont typeface="Arial" panose="020B0604020202020204" pitchFamily="34" charset="0"/>
+              <a:buChar char="•"/>
+            </a:pPr>
+            <a:endParaRPr lang="en-US" sz="2500" dirty="0"/>
+          </a:p>
+          <a:p>
+            <a:pPr marL="1657350" lvl="2" indent="-742950">
+              <a:buFont typeface="Arial" panose="020B0604020202020204" pitchFamily="34" charset="0"/>
+              <a:buChar char="•"/>
+            </a:pPr>
+            <a:r>
+              <a:rPr lang="en-US" sz="2500" dirty="0" err="1"/>
+              <a:t>viewportTileX</a:t>
+            </a:r>
+            <a:r>
+              <a:rPr lang="en-US" sz="2500" dirty="0"/>
+              <a:t> = </a:t>
+            </a:r>
+            <a:r>
+              <a:rPr lang="en-US" sz="2500" dirty="0" err="1" smtClean="0"/>
+              <a:t>ViewportWorldX</a:t>
+            </a:r>
+            <a:r>
+              <a:rPr lang="en-US" sz="2500" dirty="0" smtClean="0"/>
+              <a:t> </a:t>
+            </a:r>
+            <a:r>
+              <a:rPr lang="en-US" sz="2500" dirty="0"/>
+              <a:t>/ </a:t>
+            </a:r>
+            <a:r>
+              <a:rPr lang="en-US" sz="2500" dirty="0" err="1"/>
+              <a:t>tileSide</a:t>
+            </a:r>
+            <a:r>
+              <a:rPr lang="en-US" sz="2500" dirty="0"/>
+              <a:t>;</a:t>
+            </a:r>
+          </a:p>
+          <a:p>
+            <a:pPr marL="1657350" lvl="2" indent="-742950">
+              <a:buFont typeface="Arial" panose="020B0604020202020204" pitchFamily="34" charset="0"/>
+              <a:buChar char="•"/>
+            </a:pPr>
+            <a:r>
+              <a:rPr lang="en-US" sz="2500" dirty="0" err="1"/>
+              <a:t>viewportTileY</a:t>
+            </a:r>
+            <a:r>
+              <a:rPr lang="en-US" sz="2500" dirty="0"/>
+              <a:t> = </a:t>
+            </a:r>
+            <a:r>
+              <a:rPr lang="en-US" sz="2500" dirty="0" err="1" smtClean="0"/>
+              <a:t>ViewportWorldY</a:t>
+            </a:r>
+            <a:r>
+              <a:rPr lang="en-US" sz="2500" dirty="0" smtClean="0"/>
+              <a:t> </a:t>
+            </a:r>
+            <a:r>
+              <a:rPr lang="en-US" sz="2500" dirty="0"/>
+              <a:t>/ </a:t>
+            </a:r>
+            <a:r>
+              <a:rPr lang="en-US" sz="2500" dirty="0" err="1"/>
+              <a:t>tileSide</a:t>
+            </a:r>
+            <a:r>
+              <a:rPr lang="en-US" sz="2500" dirty="0" smtClean="0"/>
+              <a:t>;</a:t>
+            </a:r>
+            <a:endParaRPr lang="en-US" sz="2500" dirty="0"/>
           </a:p>
         </p:txBody>
       </p:sp>
@@ -5917,7 +6291,7 @@
         <p:spPr>
           <a:xfrm>
             <a:off x="0" y="0"/>
-            <a:ext cx="9144000" cy="2015936"/>
+            <a:ext cx="9144000" cy="2785378"/>
           </a:xfrm>
           <a:prstGeom prst="rect">
             <a:avLst/>
@@ -5964,10 +6338,895 @@
               <a:buFont typeface="Arial" panose="020B0604020202020204" pitchFamily="34" charset="0"/>
               <a:buChar char="•"/>
             </a:pPr>
+            <a:r>
+              <a:rPr lang="en-US" sz="2500" dirty="0" smtClean="0"/>
+              <a:t>Given a row, column location in the world </a:t>
+            </a:r>
+          </a:p>
+          <a:p>
+            <a:pPr lvl="4"/>
+            <a:r>
+              <a:rPr lang="en-US" sz="2500" dirty="0" smtClean="0"/>
+              <a:t>TileMap, how does the Viewport know what </a:t>
+            </a:r>
+          </a:p>
+          <a:p>
+            <a:pPr lvl="4"/>
+            <a:r>
+              <a:rPr lang="en-US" sz="2500" dirty="0" smtClean="0"/>
+              <a:t>Bitmap^ to draw?</a:t>
+            </a:r>
             <a:endParaRPr lang="en-US" sz="2500" dirty="0" smtClean="0"/>
           </a:p>
         </p:txBody>
       </p:sp>
+      <p:grpSp>
+        <p:nvGrpSpPr>
+          <p:cNvPr id="2" name="Group 1"/>
+          <p:cNvGrpSpPr/>
+          <p:nvPr/>
+        </p:nvGrpSpPr>
+        <p:grpSpPr>
+          <a:xfrm>
+            <a:off x="723900" y="2895600"/>
+            <a:ext cx="7696200" cy="3590330"/>
+            <a:chOff x="533400" y="2886670"/>
+            <a:chExt cx="7696200" cy="3590330"/>
+          </a:xfrm>
+        </p:grpSpPr>
+        <p:sp>
+          <p:nvSpPr>
+            <p:cNvPr id="31" name="Rectangle 30"/>
+            <p:cNvSpPr/>
+            <p:nvPr/>
+          </p:nvSpPr>
+          <p:spPr>
+            <a:xfrm>
+              <a:off x="533400" y="4355068"/>
+              <a:ext cx="1600200" cy="1295400"/>
+            </a:xfrm>
+            <a:prstGeom prst="rect">
+              <a:avLst/>
+            </a:prstGeom>
+          </p:spPr>
+          <p:style>
+            <a:lnRef idx="2">
+              <a:schemeClr val="accent1">
+                <a:shade val="50000"/>
+              </a:schemeClr>
+            </a:lnRef>
+            <a:fillRef idx="1">
+              <a:schemeClr val="accent1"/>
+            </a:fillRef>
+            <a:effectRef idx="0">
+              <a:schemeClr val="accent1"/>
+            </a:effectRef>
+            <a:fontRef idx="minor">
+              <a:schemeClr val="lt1"/>
+            </a:fontRef>
+          </p:style>
+          <p:txBody>
+            <a:bodyPr rtlCol="0" anchor="ctr"/>
+            <a:lstStyle/>
+            <a:p>
+              <a:pPr algn="ctr"/>
+              <a:r>
+                <a:rPr lang="en-NZ" dirty="0" smtClean="0"/>
+                <a:t>Viewport</a:t>
+              </a:r>
+              <a:endParaRPr lang="en-NZ" dirty="0"/>
+            </a:p>
+          </p:txBody>
+        </p:sp>
+        <p:sp>
+          <p:nvSpPr>
+            <p:cNvPr id="32" name="Rectangle 31"/>
+            <p:cNvSpPr/>
+            <p:nvPr/>
+          </p:nvSpPr>
+          <p:spPr>
+            <a:xfrm>
+              <a:off x="2590800" y="4355068"/>
+              <a:ext cx="1600200" cy="1295400"/>
+            </a:xfrm>
+            <a:prstGeom prst="rect">
+              <a:avLst/>
+            </a:prstGeom>
+          </p:spPr>
+          <p:style>
+            <a:lnRef idx="2">
+              <a:schemeClr val="accent1">
+                <a:shade val="50000"/>
+              </a:schemeClr>
+            </a:lnRef>
+            <a:fillRef idx="1">
+              <a:schemeClr val="accent1"/>
+            </a:fillRef>
+            <a:effectRef idx="0">
+              <a:schemeClr val="accent1"/>
+            </a:effectRef>
+            <a:fontRef idx="minor">
+              <a:schemeClr val="lt1"/>
+            </a:fontRef>
+          </p:style>
+          <p:txBody>
+            <a:bodyPr rtlCol="0" anchor="ctr"/>
+            <a:lstStyle/>
+            <a:p>
+              <a:pPr algn="ctr"/>
+              <a:r>
+                <a:rPr lang="en-NZ" dirty="0" err="1" smtClean="0"/>
+                <a:t>TileMap</a:t>
+              </a:r>
+              <a:endParaRPr lang="en-NZ" dirty="0"/>
+            </a:p>
+          </p:txBody>
+        </p:sp>
+        <p:sp>
+          <p:nvSpPr>
+            <p:cNvPr id="33" name="Rectangle 32"/>
+            <p:cNvSpPr/>
+            <p:nvPr/>
+          </p:nvSpPr>
+          <p:spPr>
+            <a:xfrm>
+              <a:off x="4648200" y="4355068"/>
+              <a:ext cx="1600200" cy="1295400"/>
+            </a:xfrm>
+            <a:prstGeom prst="rect">
+              <a:avLst/>
+            </a:prstGeom>
+          </p:spPr>
+          <p:style>
+            <a:lnRef idx="2">
+              <a:schemeClr val="accent1">
+                <a:shade val="50000"/>
+              </a:schemeClr>
+            </a:lnRef>
+            <a:fillRef idx="1">
+              <a:schemeClr val="accent1"/>
+            </a:fillRef>
+            <a:effectRef idx="0">
+              <a:schemeClr val="accent1"/>
+            </a:effectRef>
+            <a:fontRef idx="minor">
+              <a:schemeClr val="lt1"/>
+            </a:fontRef>
+          </p:style>
+          <p:txBody>
+            <a:bodyPr rtlCol="0" anchor="ctr"/>
+            <a:lstStyle/>
+            <a:p>
+              <a:pPr algn="ctr"/>
+              <a:r>
+                <a:rPr lang="en-NZ" dirty="0" err="1" smtClean="0"/>
+                <a:t>TileSet</a:t>
+              </a:r>
+              <a:endParaRPr lang="en-NZ" dirty="0"/>
+            </a:p>
+          </p:txBody>
+        </p:sp>
+        <p:sp>
+          <p:nvSpPr>
+            <p:cNvPr id="34" name="Rectangle 33"/>
+            <p:cNvSpPr/>
+            <p:nvPr/>
+          </p:nvSpPr>
+          <p:spPr>
+            <a:xfrm>
+              <a:off x="6629400" y="4355068"/>
+              <a:ext cx="1600200" cy="1295400"/>
+            </a:xfrm>
+            <a:prstGeom prst="rect">
+              <a:avLst/>
+            </a:prstGeom>
+          </p:spPr>
+          <p:style>
+            <a:lnRef idx="2">
+              <a:schemeClr val="accent1">
+                <a:shade val="50000"/>
+              </a:schemeClr>
+            </a:lnRef>
+            <a:fillRef idx="1">
+              <a:schemeClr val="accent1"/>
+            </a:fillRef>
+            <a:effectRef idx="0">
+              <a:schemeClr val="accent1"/>
+            </a:effectRef>
+            <a:fontRef idx="minor">
+              <a:schemeClr val="lt1"/>
+            </a:fontRef>
+          </p:style>
+          <p:txBody>
+            <a:bodyPr rtlCol="0" anchor="ctr"/>
+            <a:lstStyle/>
+            <a:p>
+              <a:pPr algn="ctr"/>
+              <a:r>
+                <a:rPr lang="en-NZ" dirty="0" smtClean="0"/>
+                <a:t>Tile</a:t>
+              </a:r>
+              <a:endParaRPr lang="en-NZ" dirty="0"/>
+            </a:p>
+          </p:txBody>
+        </p:sp>
+        <p:sp>
+          <p:nvSpPr>
+            <p:cNvPr id="35" name="TextBox 34"/>
+            <p:cNvSpPr txBox="1"/>
+            <p:nvPr/>
+          </p:nvSpPr>
+          <p:spPr>
+            <a:xfrm>
+              <a:off x="1371600" y="2886670"/>
+              <a:ext cx="1524000" cy="923330"/>
+            </a:xfrm>
+            <a:prstGeom prst="rect">
+              <a:avLst/>
+            </a:prstGeom>
+            <a:noFill/>
+          </p:spPr>
+          <p:txBody>
+            <a:bodyPr wrap="square" rtlCol="0">
+              <a:spAutoFit/>
+            </a:bodyPr>
+            <a:lstStyle/>
+            <a:p>
+              <a:pPr algn="ctr"/>
+              <a:r>
+                <a:rPr lang="en-NZ" dirty="0" smtClean="0"/>
+                <a:t>Passes </a:t>
+              </a:r>
+              <a:r>
+                <a:rPr lang="en-NZ" dirty="0" smtClean="0"/>
+                <a:t>world </a:t>
+              </a:r>
+              <a:r>
+                <a:rPr lang="en-NZ" dirty="0" smtClean="0"/>
+                <a:t>row and column</a:t>
+              </a:r>
+              <a:endParaRPr lang="en-NZ" dirty="0"/>
+            </a:p>
+          </p:txBody>
+        </p:sp>
+        <p:sp>
+          <p:nvSpPr>
+            <p:cNvPr id="36" name="TextBox 35"/>
+            <p:cNvSpPr txBox="1"/>
+            <p:nvPr/>
+          </p:nvSpPr>
+          <p:spPr>
+            <a:xfrm>
+              <a:off x="3581400" y="2886670"/>
+              <a:ext cx="1524000" cy="923330"/>
+            </a:xfrm>
+            <a:prstGeom prst="rect">
+              <a:avLst/>
+            </a:prstGeom>
+            <a:noFill/>
+          </p:spPr>
+          <p:txBody>
+            <a:bodyPr wrap="square" rtlCol="0">
+              <a:spAutoFit/>
+            </a:bodyPr>
+            <a:lstStyle/>
+            <a:p>
+              <a:pPr algn="ctr"/>
+              <a:r>
+                <a:rPr lang="en-NZ" dirty="0" smtClean="0"/>
+                <a:t>Passes </a:t>
+              </a:r>
+              <a:r>
+                <a:rPr lang="en-NZ" dirty="0" err="1" smtClean="0"/>
+                <a:t>int</a:t>
+              </a:r>
+              <a:r>
+                <a:rPr lang="en-NZ" dirty="0" smtClean="0"/>
+                <a:t> from map array...</a:t>
+              </a:r>
+              <a:endParaRPr lang="en-NZ" dirty="0"/>
+            </a:p>
+          </p:txBody>
+        </p:sp>
+        <p:sp>
+          <p:nvSpPr>
+            <p:cNvPr id="37" name="TextBox 36"/>
+            <p:cNvSpPr txBox="1"/>
+            <p:nvPr/>
+          </p:nvSpPr>
+          <p:spPr>
+            <a:xfrm>
+              <a:off x="5638800" y="3212068"/>
+              <a:ext cx="1524000" cy="646331"/>
+            </a:xfrm>
+            <a:prstGeom prst="rect">
+              <a:avLst/>
+            </a:prstGeom>
+            <a:noFill/>
+          </p:spPr>
+          <p:txBody>
+            <a:bodyPr wrap="square" rtlCol="0">
+              <a:spAutoFit/>
+            </a:bodyPr>
+            <a:lstStyle/>
+            <a:p>
+              <a:pPr algn="ctr"/>
+              <a:r>
+                <a:rPr lang="en-NZ" dirty="0" smtClean="0"/>
+                <a:t>Indexes into Tile^ array...</a:t>
+              </a:r>
+              <a:endParaRPr lang="en-NZ" dirty="0"/>
+            </a:p>
+          </p:txBody>
+        </p:sp>
+        <p:sp>
+          <p:nvSpPr>
+            <p:cNvPr id="38" name="TextBox 37"/>
+            <p:cNvSpPr txBox="1"/>
+            <p:nvPr/>
+          </p:nvSpPr>
+          <p:spPr>
+            <a:xfrm>
+              <a:off x="5791200" y="6107668"/>
+              <a:ext cx="1524000" cy="369332"/>
+            </a:xfrm>
+            <a:prstGeom prst="rect">
+              <a:avLst/>
+            </a:prstGeom>
+            <a:noFill/>
+          </p:spPr>
+          <p:txBody>
+            <a:bodyPr wrap="square" rtlCol="0">
+              <a:spAutoFit/>
+            </a:bodyPr>
+            <a:lstStyle/>
+            <a:p>
+              <a:pPr algn="ctr"/>
+              <a:r>
+                <a:rPr lang="en-NZ" dirty="0" smtClean="0"/>
+                <a:t>Bitmap^</a:t>
+              </a:r>
+              <a:endParaRPr lang="en-NZ" dirty="0"/>
+            </a:p>
+          </p:txBody>
+        </p:sp>
+        <p:sp>
+          <p:nvSpPr>
+            <p:cNvPr id="39" name="TextBox 38"/>
+            <p:cNvSpPr txBox="1"/>
+            <p:nvPr/>
+          </p:nvSpPr>
+          <p:spPr>
+            <a:xfrm>
+              <a:off x="3581400" y="6107668"/>
+              <a:ext cx="1524000" cy="369332"/>
+            </a:xfrm>
+            <a:prstGeom prst="rect">
+              <a:avLst/>
+            </a:prstGeom>
+            <a:noFill/>
+          </p:spPr>
+          <p:txBody>
+            <a:bodyPr wrap="square" rtlCol="0">
+              <a:spAutoFit/>
+            </a:bodyPr>
+            <a:lstStyle/>
+            <a:p>
+              <a:pPr algn="ctr"/>
+              <a:r>
+                <a:rPr lang="en-NZ" dirty="0" smtClean="0"/>
+                <a:t>Bitmap^</a:t>
+              </a:r>
+              <a:endParaRPr lang="en-NZ" dirty="0"/>
+            </a:p>
+          </p:txBody>
+        </p:sp>
+        <p:sp>
+          <p:nvSpPr>
+            <p:cNvPr id="40" name="TextBox 39"/>
+            <p:cNvSpPr txBox="1"/>
+            <p:nvPr/>
+          </p:nvSpPr>
+          <p:spPr>
+            <a:xfrm>
+              <a:off x="1524000" y="6107668"/>
+              <a:ext cx="1524000" cy="369332"/>
+            </a:xfrm>
+            <a:prstGeom prst="rect">
+              <a:avLst/>
+            </a:prstGeom>
+            <a:noFill/>
+          </p:spPr>
+          <p:txBody>
+            <a:bodyPr wrap="square" rtlCol="0">
+              <a:spAutoFit/>
+            </a:bodyPr>
+            <a:lstStyle/>
+            <a:p>
+              <a:pPr algn="ctr"/>
+              <a:r>
+                <a:rPr lang="en-NZ" dirty="0" smtClean="0"/>
+                <a:t>Bitmap^</a:t>
+              </a:r>
+              <a:endParaRPr lang="en-NZ" dirty="0"/>
+            </a:p>
+          </p:txBody>
+        </p:sp>
+        <p:grpSp>
+          <p:nvGrpSpPr>
+            <p:cNvPr id="41" name="Group 40"/>
+            <p:cNvGrpSpPr/>
+            <p:nvPr/>
+          </p:nvGrpSpPr>
+          <p:grpSpPr>
+            <a:xfrm>
+              <a:off x="3543300" y="3897868"/>
+              <a:ext cx="1562100" cy="457200"/>
+              <a:chOff x="3543300" y="3352800"/>
+              <a:chExt cx="1562100" cy="457200"/>
+            </a:xfrm>
+          </p:grpSpPr>
+          <p:cxnSp>
+            <p:nvCxnSpPr>
+              <p:cNvPr id="42" name="Straight Arrow Connector 41"/>
+              <p:cNvCxnSpPr/>
+              <p:nvPr/>
+            </p:nvCxnSpPr>
+            <p:spPr>
+              <a:xfrm>
+                <a:off x="3733800" y="3352800"/>
+                <a:ext cx="1371600" cy="0"/>
+              </a:xfrm>
+              <a:prstGeom prst="straightConnector1">
+                <a:avLst/>
+              </a:prstGeom>
+              <a:ln w="57150">
+                <a:tailEnd type="arrow"/>
+              </a:ln>
+            </p:spPr>
+            <p:style>
+              <a:lnRef idx="1">
+                <a:schemeClr val="accent1"/>
+              </a:lnRef>
+              <a:fillRef idx="0">
+                <a:schemeClr val="accent1"/>
+              </a:fillRef>
+              <a:effectRef idx="0">
+                <a:schemeClr val="accent1"/>
+              </a:effectRef>
+              <a:fontRef idx="minor">
+                <a:schemeClr val="tx1"/>
+              </a:fontRef>
+            </p:style>
+          </p:cxnSp>
+          <p:cxnSp>
+            <p:nvCxnSpPr>
+              <p:cNvPr id="43" name="Straight Connector 42"/>
+              <p:cNvCxnSpPr/>
+              <p:nvPr/>
+            </p:nvCxnSpPr>
+            <p:spPr>
+              <a:xfrm flipH="1">
+                <a:off x="3543300" y="3352800"/>
+                <a:ext cx="190500" cy="457200"/>
+              </a:xfrm>
+              <a:prstGeom prst="line">
+                <a:avLst/>
+              </a:prstGeom>
+              <a:ln w="57150"/>
+            </p:spPr>
+            <p:style>
+              <a:lnRef idx="1">
+                <a:schemeClr val="accent1"/>
+              </a:lnRef>
+              <a:fillRef idx="0">
+                <a:schemeClr val="accent1"/>
+              </a:fillRef>
+              <a:effectRef idx="0">
+                <a:schemeClr val="accent1"/>
+              </a:effectRef>
+              <a:fontRef idx="minor">
+                <a:schemeClr val="tx1"/>
+              </a:fontRef>
+            </p:style>
+          </p:cxnSp>
+        </p:grpSp>
+        <p:grpSp>
+          <p:nvGrpSpPr>
+            <p:cNvPr id="44" name="Group 43"/>
+            <p:cNvGrpSpPr/>
+            <p:nvPr/>
+          </p:nvGrpSpPr>
+          <p:grpSpPr>
+            <a:xfrm>
+              <a:off x="5600700" y="3897868"/>
+              <a:ext cx="1562100" cy="457200"/>
+              <a:chOff x="5600700" y="3352800"/>
+              <a:chExt cx="1562100" cy="457200"/>
+            </a:xfrm>
+          </p:grpSpPr>
+          <p:cxnSp>
+            <p:nvCxnSpPr>
+              <p:cNvPr id="45" name="Straight Arrow Connector 44"/>
+              <p:cNvCxnSpPr/>
+              <p:nvPr/>
+            </p:nvCxnSpPr>
+            <p:spPr>
+              <a:xfrm>
+                <a:off x="5791200" y="3352800"/>
+                <a:ext cx="1371600" cy="0"/>
+              </a:xfrm>
+              <a:prstGeom prst="straightConnector1">
+                <a:avLst/>
+              </a:prstGeom>
+              <a:ln w="57150">
+                <a:tailEnd type="arrow"/>
+              </a:ln>
+            </p:spPr>
+            <p:style>
+              <a:lnRef idx="1">
+                <a:schemeClr val="accent1"/>
+              </a:lnRef>
+              <a:fillRef idx="0">
+                <a:schemeClr val="accent1"/>
+              </a:fillRef>
+              <a:effectRef idx="0">
+                <a:schemeClr val="accent1"/>
+              </a:effectRef>
+              <a:fontRef idx="minor">
+                <a:schemeClr val="tx1"/>
+              </a:fontRef>
+            </p:style>
+          </p:cxnSp>
+          <p:cxnSp>
+            <p:nvCxnSpPr>
+              <p:cNvPr id="46" name="Straight Connector 45"/>
+              <p:cNvCxnSpPr/>
+              <p:nvPr/>
+            </p:nvCxnSpPr>
+            <p:spPr>
+              <a:xfrm flipH="1">
+                <a:off x="5600700" y="3352800"/>
+                <a:ext cx="190500" cy="457200"/>
+              </a:xfrm>
+              <a:prstGeom prst="line">
+                <a:avLst/>
+              </a:prstGeom>
+              <a:ln w="57150"/>
+            </p:spPr>
+            <p:style>
+              <a:lnRef idx="1">
+                <a:schemeClr val="accent1"/>
+              </a:lnRef>
+              <a:fillRef idx="0">
+                <a:schemeClr val="accent1"/>
+              </a:fillRef>
+              <a:effectRef idx="0">
+                <a:schemeClr val="accent1"/>
+              </a:effectRef>
+              <a:fontRef idx="minor">
+                <a:schemeClr val="tx1"/>
+              </a:fontRef>
+            </p:style>
+          </p:cxnSp>
+        </p:grpSp>
+        <p:grpSp>
+          <p:nvGrpSpPr>
+            <p:cNvPr id="47" name="Group 46"/>
+            <p:cNvGrpSpPr/>
+            <p:nvPr/>
+          </p:nvGrpSpPr>
+          <p:grpSpPr>
+            <a:xfrm>
+              <a:off x="5867400" y="5638800"/>
+              <a:ext cx="1562100" cy="392668"/>
+              <a:chOff x="5867400" y="5093732"/>
+              <a:chExt cx="1562100" cy="392668"/>
+            </a:xfrm>
+          </p:grpSpPr>
+          <p:cxnSp>
+            <p:nvCxnSpPr>
+              <p:cNvPr id="48" name="Straight Arrow Connector 47"/>
+              <p:cNvCxnSpPr/>
+              <p:nvPr/>
+            </p:nvCxnSpPr>
+            <p:spPr>
+              <a:xfrm flipH="1">
+                <a:off x="5867400" y="5486400"/>
+                <a:ext cx="1371600" cy="0"/>
+              </a:xfrm>
+              <a:prstGeom prst="straightConnector1">
+                <a:avLst/>
+              </a:prstGeom>
+              <a:ln w="57150">
+                <a:tailEnd type="arrow"/>
+              </a:ln>
+            </p:spPr>
+            <p:style>
+              <a:lnRef idx="1">
+                <a:schemeClr val="accent1"/>
+              </a:lnRef>
+              <a:fillRef idx="0">
+                <a:schemeClr val="accent1"/>
+              </a:fillRef>
+              <a:effectRef idx="0">
+                <a:schemeClr val="accent1"/>
+              </a:effectRef>
+              <a:fontRef idx="minor">
+                <a:schemeClr val="tx1"/>
+              </a:fontRef>
+            </p:style>
+          </p:cxnSp>
+          <p:cxnSp>
+            <p:nvCxnSpPr>
+              <p:cNvPr id="49" name="Straight Connector 48"/>
+              <p:cNvCxnSpPr/>
+              <p:nvPr/>
+            </p:nvCxnSpPr>
+            <p:spPr>
+              <a:xfrm flipH="1">
+                <a:off x="7200900" y="5093732"/>
+                <a:ext cx="228600" cy="381000"/>
+              </a:xfrm>
+              <a:prstGeom prst="line">
+                <a:avLst/>
+              </a:prstGeom>
+              <a:ln w="57150"/>
+            </p:spPr>
+            <p:style>
+              <a:lnRef idx="1">
+                <a:schemeClr val="accent1"/>
+              </a:lnRef>
+              <a:fillRef idx="0">
+                <a:schemeClr val="accent1"/>
+              </a:fillRef>
+              <a:effectRef idx="0">
+                <a:schemeClr val="accent1"/>
+              </a:effectRef>
+              <a:fontRef idx="minor">
+                <a:schemeClr val="tx1"/>
+              </a:fontRef>
+            </p:style>
+          </p:cxnSp>
+        </p:grpSp>
+        <p:grpSp>
+          <p:nvGrpSpPr>
+            <p:cNvPr id="50" name="Group 49"/>
+            <p:cNvGrpSpPr/>
+            <p:nvPr/>
+          </p:nvGrpSpPr>
+          <p:grpSpPr>
+            <a:xfrm>
+              <a:off x="3657600" y="5650468"/>
+              <a:ext cx="1600200" cy="381000"/>
+              <a:chOff x="3657600" y="5105400"/>
+              <a:chExt cx="1600200" cy="381000"/>
+            </a:xfrm>
+          </p:grpSpPr>
+          <p:cxnSp>
+            <p:nvCxnSpPr>
+              <p:cNvPr id="51" name="Straight Arrow Connector 50"/>
+              <p:cNvCxnSpPr/>
+              <p:nvPr/>
+            </p:nvCxnSpPr>
+            <p:spPr>
+              <a:xfrm flipH="1">
+                <a:off x="3657600" y="5486400"/>
+                <a:ext cx="1371600" cy="0"/>
+              </a:xfrm>
+              <a:prstGeom prst="straightConnector1">
+                <a:avLst/>
+              </a:prstGeom>
+              <a:ln w="57150">
+                <a:tailEnd type="arrow"/>
+              </a:ln>
+            </p:spPr>
+            <p:style>
+              <a:lnRef idx="1">
+                <a:schemeClr val="accent1"/>
+              </a:lnRef>
+              <a:fillRef idx="0">
+                <a:schemeClr val="accent1"/>
+              </a:fillRef>
+              <a:effectRef idx="0">
+                <a:schemeClr val="accent1"/>
+              </a:effectRef>
+              <a:fontRef idx="minor">
+                <a:schemeClr val="tx1"/>
+              </a:fontRef>
+            </p:style>
+          </p:cxnSp>
+          <p:cxnSp>
+            <p:nvCxnSpPr>
+              <p:cNvPr id="52" name="Straight Connector 51"/>
+              <p:cNvCxnSpPr/>
+              <p:nvPr/>
+            </p:nvCxnSpPr>
+            <p:spPr>
+              <a:xfrm flipH="1">
+                <a:off x="5029200" y="5105400"/>
+                <a:ext cx="228600" cy="381000"/>
+              </a:xfrm>
+              <a:prstGeom prst="line">
+                <a:avLst/>
+              </a:prstGeom>
+              <a:ln w="57150"/>
+            </p:spPr>
+            <p:style>
+              <a:lnRef idx="1">
+                <a:schemeClr val="accent1"/>
+              </a:lnRef>
+              <a:fillRef idx="0">
+                <a:schemeClr val="accent1"/>
+              </a:fillRef>
+              <a:effectRef idx="0">
+                <a:schemeClr val="accent1"/>
+              </a:effectRef>
+              <a:fontRef idx="minor">
+                <a:schemeClr val="tx1"/>
+              </a:fontRef>
+            </p:style>
+          </p:cxnSp>
+        </p:grpSp>
+        <p:grpSp>
+          <p:nvGrpSpPr>
+            <p:cNvPr id="53" name="Group 52"/>
+            <p:cNvGrpSpPr/>
+            <p:nvPr/>
+          </p:nvGrpSpPr>
+          <p:grpSpPr>
+            <a:xfrm>
+              <a:off x="1524000" y="5650468"/>
+              <a:ext cx="1600200" cy="381000"/>
+              <a:chOff x="1524000" y="5105400"/>
+              <a:chExt cx="1600200" cy="381000"/>
+            </a:xfrm>
+          </p:grpSpPr>
+          <p:cxnSp>
+            <p:nvCxnSpPr>
+              <p:cNvPr id="54" name="Straight Arrow Connector 53"/>
+              <p:cNvCxnSpPr/>
+              <p:nvPr/>
+            </p:nvCxnSpPr>
+            <p:spPr>
+              <a:xfrm flipH="1">
+                <a:off x="1524000" y="5486400"/>
+                <a:ext cx="1371600" cy="0"/>
+              </a:xfrm>
+              <a:prstGeom prst="straightConnector1">
+                <a:avLst/>
+              </a:prstGeom>
+              <a:ln w="57150">
+                <a:tailEnd type="arrow"/>
+              </a:ln>
+            </p:spPr>
+            <p:style>
+              <a:lnRef idx="1">
+                <a:schemeClr val="accent1"/>
+              </a:lnRef>
+              <a:fillRef idx="0">
+                <a:schemeClr val="accent1"/>
+              </a:fillRef>
+              <a:effectRef idx="0">
+                <a:schemeClr val="accent1"/>
+              </a:effectRef>
+              <a:fontRef idx="minor">
+                <a:schemeClr val="tx1"/>
+              </a:fontRef>
+            </p:style>
+          </p:cxnSp>
+          <p:cxnSp>
+            <p:nvCxnSpPr>
+              <p:cNvPr id="55" name="Straight Connector 54"/>
+              <p:cNvCxnSpPr/>
+              <p:nvPr/>
+            </p:nvCxnSpPr>
+            <p:spPr>
+              <a:xfrm flipH="1">
+                <a:off x="2895600" y="5105400"/>
+                <a:ext cx="228600" cy="381000"/>
+              </a:xfrm>
+              <a:prstGeom prst="line">
+                <a:avLst/>
+              </a:prstGeom>
+              <a:ln w="57150"/>
+            </p:spPr>
+            <p:style>
+              <a:lnRef idx="1">
+                <a:schemeClr val="accent1"/>
+              </a:lnRef>
+              <a:fillRef idx="0">
+                <a:schemeClr val="accent1"/>
+              </a:fillRef>
+              <a:effectRef idx="0">
+                <a:schemeClr val="accent1"/>
+              </a:effectRef>
+              <a:fontRef idx="minor">
+                <a:schemeClr val="tx1"/>
+              </a:fontRef>
+            </p:style>
+          </p:cxnSp>
+        </p:grpSp>
+        <p:grpSp>
+          <p:nvGrpSpPr>
+            <p:cNvPr id="56" name="Group 55"/>
+            <p:cNvGrpSpPr/>
+            <p:nvPr/>
+          </p:nvGrpSpPr>
+          <p:grpSpPr>
+            <a:xfrm>
+              <a:off x="1295400" y="3886202"/>
+              <a:ext cx="1600200" cy="685798"/>
+              <a:chOff x="1295400" y="3886200"/>
+              <a:chExt cx="1600200" cy="381000"/>
+            </a:xfrm>
+          </p:grpSpPr>
+          <p:cxnSp>
+            <p:nvCxnSpPr>
+              <p:cNvPr id="57" name="Straight Arrow Connector 56"/>
+              <p:cNvCxnSpPr/>
+              <p:nvPr/>
+            </p:nvCxnSpPr>
+            <p:spPr>
+              <a:xfrm>
+                <a:off x="1524000" y="3897862"/>
+                <a:ext cx="1371600" cy="0"/>
+              </a:xfrm>
+              <a:prstGeom prst="straightConnector1">
+                <a:avLst/>
+              </a:prstGeom>
+              <a:ln w="57150">
+                <a:tailEnd type="arrow"/>
+              </a:ln>
+            </p:spPr>
+            <p:style>
+              <a:lnRef idx="1">
+                <a:schemeClr val="accent1"/>
+              </a:lnRef>
+              <a:fillRef idx="0">
+                <a:schemeClr val="accent1"/>
+              </a:fillRef>
+              <a:effectRef idx="0">
+                <a:schemeClr val="accent1"/>
+              </a:effectRef>
+              <a:fontRef idx="minor">
+                <a:schemeClr val="tx1"/>
+              </a:fontRef>
+            </p:style>
+          </p:cxnSp>
+          <p:cxnSp>
+            <p:nvCxnSpPr>
+              <p:cNvPr id="58" name="Straight Connector 57"/>
+              <p:cNvCxnSpPr/>
+              <p:nvPr/>
+            </p:nvCxnSpPr>
+            <p:spPr>
+              <a:xfrm flipH="1">
+                <a:off x="1295400" y="3886200"/>
+                <a:ext cx="228600" cy="381000"/>
+              </a:xfrm>
+              <a:prstGeom prst="line">
+                <a:avLst/>
+              </a:prstGeom>
+              <a:ln w="57150"/>
+            </p:spPr>
+            <p:style>
+              <a:lnRef idx="1">
+                <a:schemeClr val="accent1"/>
+              </a:lnRef>
+              <a:fillRef idx="0">
+                <a:schemeClr val="accent1"/>
+              </a:fillRef>
+              <a:effectRef idx="0">
+                <a:schemeClr val="accent1"/>
+              </a:effectRef>
+              <a:fontRef idx="minor">
+                <a:schemeClr val="tx1"/>
+              </a:fontRef>
+            </p:style>
+          </p:cxnSp>
+        </p:grpSp>
+      </p:grpSp>
     </p:spTree>
     <p:extLst>
       <p:ext uri="{BB962C8B-B14F-4D97-AF65-F5344CB8AC3E}">
@@ -6064,6 +7323,36 @@
           </a:p>
         </p:txBody>
       </p:sp>
+      <p:pic>
+        <p:nvPicPr>
+          <p:cNvPr id="2" name="Picture 1"/>
+          <p:cNvPicPr>
+            <a:picLocks noChangeAspect="1"/>
+          </p:cNvPicPr>
+          <p:nvPr/>
+        </p:nvPicPr>
+        <p:blipFill>
+          <a:blip r:embed="rId3">
+            <a:extLst>
+              <a:ext uri="{28A0092B-C50C-407E-A947-70E740481C1C}">
+                <a14:useLocalDpi xmlns:a14="http://schemas.microsoft.com/office/drawing/2010/main" val="0"/>
+              </a:ext>
+            </a:extLst>
+          </a:blip>
+          <a:stretch>
+            <a:fillRect/>
+          </a:stretch>
+        </p:blipFill>
+        <p:spPr>
+          <a:xfrm>
+            <a:off x="1388269" y="1828800"/>
+            <a:ext cx="6367462" cy="3755170"/>
+          </a:xfrm>
+          <a:prstGeom prst="rect">
+            <a:avLst/>
+          </a:prstGeom>
+        </p:spPr>
+      </p:pic>
     </p:spTree>
     <p:extLst>
       <p:ext uri="{BB962C8B-B14F-4D97-AF65-F5344CB8AC3E}">
@@ -6156,10 +7445,44 @@
               <a:buFont typeface="Arial" panose="020B0604020202020204" pitchFamily="34" charset="0"/>
               <a:buChar char="•"/>
             </a:pPr>
+            <a:r>
+              <a:rPr lang="en-US" sz="2500" dirty="0" smtClean="0"/>
+              <a:t>Note this is not the final code…</a:t>
+            </a:r>
             <a:endParaRPr lang="en-US" sz="2500" dirty="0" smtClean="0"/>
           </a:p>
         </p:txBody>
       </p:sp>
+      <p:pic>
+        <p:nvPicPr>
+          <p:cNvPr id="4" name="Picture 3"/>
+          <p:cNvPicPr>
+            <a:picLocks noChangeAspect="1"/>
+          </p:cNvPicPr>
+          <p:nvPr/>
+        </p:nvPicPr>
+        <p:blipFill>
+          <a:blip r:embed="rId3">
+            <a:extLst>
+              <a:ext uri="{28A0092B-C50C-407E-A947-70E740481C1C}">
+                <a14:useLocalDpi xmlns:a14="http://schemas.microsoft.com/office/drawing/2010/main" val="0"/>
+              </a:ext>
+            </a:extLst>
+          </a:blip>
+          <a:stretch>
+            <a:fillRect/>
+          </a:stretch>
+        </p:blipFill>
+        <p:spPr>
+          <a:xfrm>
+            <a:off x="985837" y="2590800"/>
+            <a:ext cx="7172325" cy="2695575"/>
+          </a:xfrm>
+          <a:prstGeom prst="rect">
+            <a:avLst/>
+          </a:prstGeom>
+        </p:spPr>
+      </p:pic>
     </p:spTree>
     <p:extLst>
       <p:ext uri="{BB962C8B-B14F-4D97-AF65-F5344CB8AC3E}">
@@ -6217,7 +7540,7 @@
         <p:spPr>
           <a:xfrm>
             <a:off x="0" y="0"/>
-            <a:ext cx="9144000" cy="2015936"/>
+            <a:ext cx="9144000" cy="6093976"/>
           </a:xfrm>
           <a:prstGeom prst="rect">
             <a:avLst/>
@@ -6252,7 +7575,199 @@
               <a:buFont typeface="Arial" panose="020B0604020202020204" pitchFamily="34" charset="0"/>
               <a:buChar char="•"/>
             </a:pPr>
-            <a:endParaRPr lang="en-US" sz="2500" dirty="0" smtClean="0"/>
+            <a:r>
+              <a:rPr lang="en-NZ" sz="2500" dirty="0"/>
+              <a:t>Place the upper left tile at 0,0 on the canvas </a:t>
+            </a:r>
+            <a:endParaRPr lang="en-NZ" sz="2500" dirty="0" smtClean="0"/>
+          </a:p>
+          <a:p>
+            <a:pPr lvl="2"/>
+            <a:r>
+              <a:rPr lang="en-NZ" sz="2500" dirty="0"/>
+              <a:t>	</a:t>
+            </a:r>
+            <a:r>
+              <a:rPr lang="en-NZ" sz="2500" dirty="0" smtClean="0"/>
+              <a:t>and </a:t>
+            </a:r>
+            <a:r>
+              <a:rPr lang="en-NZ" sz="2500" dirty="0"/>
+              <a:t>iterate as normal using the loop driver </a:t>
+            </a:r>
+            <a:r>
+              <a:rPr lang="en-NZ" sz="2500" dirty="0" smtClean="0"/>
+              <a:t>variables</a:t>
+            </a:r>
+            <a:endParaRPr lang="en-NZ" sz="2500" dirty="0"/>
+          </a:p>
+          <a:p>
+            <a:pPr marL="1657350" lvl="2" indent="-742950">
+              <a:buFont typeface="Arial" panose="020B0604020202020204" pitchFamily="34" charset="0"/>
+              <a:buChar char="•"/>
+            </a:pPr>
+            <a:r>
+              <a:rPr lang="en-NZ" sz="2500" dirty="0"/>
+              <a:t>What if your Viewport edge is not on a tile boundary?</a:t>
+            </a:r>
+          </a:p>
+          <a:p>
+            <a:pPr marL="1657350" lvl="2" indent="-742950">
+              <a:buFont typeface="Arial" panose="020B0604020202020204" pitchFamily="34" charset="0"/>
+              <a:buChar char="•"/>
+            </a:pPr>
+            <a:r>
+              <a:rPr lang="en-NZ" sz="2500" dirty="0"/>
+              <a:t>You need to start drawing in the middle of a </a:t>
+            </a:r>
+            <a:r>
+              <a:rPr lang="en-NZ" sz="2500" dirty="0" smtClean="0"/>
+              <a:t>tile</a:t>
+            </a:r>
+            <a:endParaRPr lang="en-NZ" sz="2500" dirty="0"/>
+          </a:p>
+          <a:p>
+            <a:pPr marL="1657350" lvl="2" indent="-742950">
+              <a:buFont typeface="Arial" panose="020B0604020202020204" pitchFamily="34" charset="0"/>
+              <a:buChar char="•"/>
+            </a:pPr>
+            <a:r>
+              <a:rPr lang="en-NZ" sz="2500" dirty="0"/>
+              <a:t>Two steps:</a:t>
+            </a:r>
+          </a:p>
+          <a:p>
+            <a:pPr lvl="4"/>
+            <a:r>
+              <a:rPr lang="en-NZ" sz="2000" dirty="0"/>
+              <a:t>Figure out how many pixels you are from the tile </a:t>
+            </a:r>
+            <a:r>
+              <a:rPr lang="en-NZ" sz="2000" dirty="0" smtClean="0"/>
+              <a:t>boundary</a:t>
+            </a:r>
+            <a:endParaRPr lang="en-NZ" sz="2000" dirty="0"/>
+          </a:p>
+          <a:p>
+            <a:pPr lvl="4"/>
+            <a:r>
+              <a:rPr lang="en-NZ" sz="2000" dirty="0"/>
+              <a:t>Shift your drawing location that many pixels to the </a:t>
+            </a:r>
+            <a:r>
+              <a:rPr lang="en-NZ" sz="2000" dirty="0" smtClean="0"/>
+              <a:t>left</a:t>
+            </a:r>
+            <a:endParaRPr lang="en-NZ" sz="2000" dirty="0"/>
+          </a:p>
+          <a:p>
+            <a:pPr marL="1657350" lvl="2" indent="-742950">
+              <a:buFont typeface="Arial" panose="020B0604020202020204" pitchFamily="34" charset="0"/>
+              <a:buChar char="•"/>
+            </a:pPr>
+            <a:endParaRPr lang="en-NZ" sz="2500" dirty="0" smtClean="0"/>
+          </a:p>
+          <a:p>
+            <a:pPr marL="1657350" lvl="2" indent="-742950">
+              <a:buFont typeface="Arial" panose="020B0604020202020204" pitchFamily="34" charset="0"/>
+              <a:buChar char="•"/>
+            </a:pPr>
+            <a:r>
+              <a:rPr lang="en-NZ" sz="2500" dirty="0" err="1" smtClean="0"/>
+              <a:t>viewportOffsetX</a:t>
+            </a:r>
+            <a:r>
+              <a:rPr lang="en-NZ" sz="2500" dirty="0" smtClean="0"/>
+              <a:t> </a:t>
+            </a:r>
+            <a:r>
+              <a:rPr lang="en-NZ" sz="2500" dirty="0"/>
+              <a:t>= </a:t>
+            </a:r>
+            <a:r>
+              <a:rPr lang="en-NZ" sz="2500" dirty="0" err="1" smtClean="0"/>
+              <a:t>ViewportWorldX</a:t>
+            </a:r>
+            <a:r>
+              <a:rPr lang="en-NZ" sz="2500" dirty="0" smtClean="0"/>
+              <a:t> </a:t>
+            </a:r>
+            <a:r>
+              <a:rPr lang="en-NZ" sz="2500" dirty="0"/>
+              <a:t>% </a:t>
+            </a:r>
+            <a:r>
+              <a:rPr lang="en-NZ" sz="2500" dirty="0" err="1"/>
+              <a:t>tileSide</a:t>
+            </a:r>
+            <a:r>
+              <a:rPr lang="en-NZ" sz="2500" dirty="0"/>
+              <a:t>;</a:t>
+            </a:r>
+          </a:p>
+          <a:p>
+            <a:pPr marL="1657350" lvl="2" indent="-742950">
+              <a:buFont typeface="Arial" panose="020B0604020202020204" pitchFamily="34" charset="0"/>
+              <a:buChar char="•"/>
+            </a:pPr>
+            <a:r>
+              <a:rPr lang="en-NZ" sz="2500" dirty="0" err="1"/>
+              <a:t>viewportOffsetY</a:t>
+            </a:r>
+            <a:r>
+              <a:rPr lang="en-NZ" sz="2500" dirty="0"/>
+              <a:t> = </a:t>
+            </a:r>
+            <a:r>
+              <a:rPr lang="en-NZ" sz="2500" dirty="0" err="1" smtClean="0"/>
+              <a:t>ViewportWorldY</a:t>
+            </a:r>
+            <a:r>
+              <a:rPr lang="en-NZ" sz="2500" dirty="0" smtClean="0"/>
+              <a:t> </a:t>
+            </a:r>
+            <a:r>
+              <a:rPr lang="en-NZ" sz="2500" dirty="0"/>
+              <a:t>% </a:t>
+            </a:r>
+            <a:r>
+              <a:rPr lang="en-NZ" sz="2500" dirty="0" err="1"/>
+              <a:t>tileSide</a:t>
+            </a:r>
+            <a:r>
+              <a:rPr lang="en-NZ" sz="2500" dirty="0"/>
+              <a:t>;</a:t>
+            </a:r>
+          </a:p>
+          <a:p>
+            <a:pPr marL="1657350" lvl="2" indent="-742950">
+              <a:buFont typeface="Arial" panose="020B0604020202020204" pitchFamily="34" charset="0"/>
+              <a:buChar char="•"/>
+            </a:pPr>
+            <a:endParaRPr lang="en-NZ" sz="2500" dirty="0" smtClean="0"/>
+          </a:p>
+          <a:p>
+            <a:pPr marL="1657350" lvl="2" indent="-742950">
+              <a:buFont typeface="Arial" panose="020B0604020202020204" pitchFamily="34" charset="0"/>
+              <a:buChar char="•"/>
+            </a:pPr>
+            <a:r>
+              <a:rPr lang="en-NZ" sz="2500" dirty="0" err="1" smtClean="0"/>
+              <a:t>DrawImage</a:t>
+            </a:r>
+            <a:r>
+              <a:rPr lang="en-NZ" sz="2500" dirty="0" smtClean="0"/>
+              <a:t> </a:t>
+            </a:r>
+            <a:r>
+              <a:rPr lang="en-NZ" sz="2500" dirty="0"/>
+              <a:t>happy to take a negative pixel </a:t>
+            </a:r>
+            <a:r>
+              <a:rPr lang="en-NZ" sz="2500" dirty="0" smtClean="0"/>
+              <a:t>position</a:t>
+            </a:r>
+            <a:endParaRPr lang="en-NZ" sz="2500" dirty="0"/>
           </a:p>
         </p:txBody>
       </p:sp>
@@ -6451,7 +7966,7 @@
         <p:spPr>
           <a:xfrm>
             <a:off x="0" y="0"/>
-            <a:ext cx="9144000" cy="2015936"/>
+            <a:ext cx="9144000" cy="1631216"/>
           </a:xfrm>
           <a:prstGeom prst="rect">
             <a:avLst/>
@@ -6470,7 +7985,7 @@
             <a:pPr lvl="1"/>
             <a:r>
               <a:rPr lang="en-AU" sz="3500" b="1" dirty="0" smtClean="0"/>
-              <a:t>Moving the Viewport</a:t>
+              <a:t>Where to draw on the screen</a:t>
             </a:r>
             <a:endParaRPr lang="en-US" sz="3500" b="1" dirty="0" smtClean="0"/>
           </a:p>
@@ -6480,6 +7995,167 @@
               <a:buChar char="•"/>
             </a:pPr>
             <a:endParaRPr lang="en-US" sz="2500" dirty="0" smtClean="0"/>
+          </a:p>
+        </p:txBody>
+      </p:sp>
+      <p:pic>
+        <p:nvPicPr>
+          <p:cNvPr id="4" name="Picture 3"/>
+          <p:cNvPicPr>
+            <a:picLocks noChangeAspect="1"/>
+          </p:cNvPicPr>
+          <p:nvPr/>
+        </p:nvPicPr>
+        <p:blipFill>
+          <a:blip r:embed="rId3">
+            <a:extLst>
+              <a:ext uri="{28A0092B-C50C-407E-A947-70E740481C1C}">
+                <a14:useLocalDpi xmlns:a14="http://schemas.microsoft.com/office/drawing/2010/main" val="0"/>
+              </a:ext>
+            </a:extLst>
+          </a:blip>
+          <a:stretch>
+            <a:fillRect/>
+          </a:stretch>
+        </p:blipFill>
+        <p:spPr>
+          <a:xfrm>
+            <a:off x="976312" y="2038350"/>
+            <a:ext cx="7191375" cy="2781300"/>
+          </a:xfrm>
+          <a:prstGeom prst="rect">
+            <a:avLst/>
+          </a:prstGeom>
+        </p:spPr>
+      </p:pic>
+    </p:spTree>
+    <p:extLst>
+      <p:ext uri="{BB962C8B-B14F-4D97-AF65-F5344CB8AC3E}">
+        <p14:creationId xmlns:p14="http://schemas.microsoft.com/office/powerpoint/2010/main" val="848788475"/>
+      </p:ext>
+    </p:extLst>
+  </p:cSld>
+  <p:clrMapOvr>
+    <a:masterClrMapping/>
+  </p:clrMapOvr>
+  <p:timing>
+    <p:tnLst>
+      <p:par>
+        <p:cTn id="1" dur="indefinite" restart="never" nodeType="tmRoot"/>
+      </p:par>
+    </p:tnLst>
+  </p:timing>
+</p:sld>
+</file>
+
+<file path=ppt/slides/slide21.xml><?xml version="1.0" encoding="utf-8"?>
+<p:sld xmlns:a="http://schemas.openxmlformats.org/drawingml/2006/main" xmlns:r="http://schemas.openxmlformats.org/officeDocument/2006/relationships" xmlns:p="http://schemas.openxmlformats.org/presentationml/2006/main">
+  <p:cSld>
+    <p:bg>
+      <p:bgPr>
+        <a:solidFill>
+          <a:schemeClr val="accent5">
+            <a:lumMod val="60000"/>
+            <a:lumOff val="40000"/>
+          </a:schemeClr>
+        </a:solidFill>
+        <a:effectLst/>
+      </p:bgPr>
+    </p:bg>
+    <p:spTree>
+      <p:nvGrpSpPr>
+        <p:cNvPr id="1" name=""/>
+        <p:cNvGrpSpPr/>
+        <p:nvPr/>
+      </p:nvGrpSpPr>
+      <p:grpSpPr>
+        <a:xfrm>
+          <a:off x="0" y="0"/>
+          <a:ext cx="0" cy="0"/>
+          <a:chOff x="0" y="0"/>
+          <a:chExt cx="0" cy="0"/>
+        </a:xfrm>
+      </p:grpSpPr>
+      <p:sp>
+        <p:nvSpPr>
+          <p:cNvPr id="3" name="Rectangle 2"/>
+          <p:cNvSpPr/>
+          <p:nvPr/>
+        </p:nvSpPr>
+        <p:spPr>
+          <a:xfrm>
+            <a:off x="0" y="0"/>
+            <a:ext cx="9144000" cy="2785378"/>
+          </a:xfrm>
+          <a:prstGeom prst="rect">
+            <a:avLst/>
+          </a:prstGeom>
+        </p:spPr>
+        <p:txBody>
+          <a:bodyPr wrap="square">
+            <a:spAutoFit/>
+          </a:bodyPr>
+          <a:lstStyle/>
+          <a:p>
+            <a:pPr algn="ctr"/>
+            <a:endParaRPr lang="en-US" sz="4000" b="1" dirty="0"/>
+          </a:p>
+          <a:p>
+            <a:pPr lvl="1"/>
+            <a:r>
+              <a:rPr lang="en-AU" sz="3500" b="1" dirty="0" smtClean="0"/>
+              <a:t>Moving the Viewport</a:t>
+            </a:r>
+            <a:endParaRPr lang="en-US" sz="3500" b="1" dirty="0" smtClean="0"/>
+          </a:p>
+          <a:p>
+            <a:pPr marL="1657350" lvl="2" indent="-742950">
+              <a:buFont typeface="Arial" panose="020B0604020202020204" pitchFamily="34" charset="0"/>
+              <a:buChar char="•"/>
+            </a:pPr>
+            <a:endParaRPr lang="en-US" sz="2500" dirty="0" smtClean="0"/>
+          </a:p>
+          <a:p>
+            <a:pPr marL="1657350" lvl="2" indent="-742950">
+              <a:buFont typeface="Arial" panose="020B0604020202020204" pitchFamily="34" charset="0"/>
+              <a:buChar char="•"/>
+            </a:pPr>
+            <a:r>
+              <a:rPr lang="en-NZ" sz="2500" dirty="0"/>
+              <a:t>Adjust </a:t>
+            </a:r>
+            <a:r>
+              <a:rPr lang="en-NZ" sz="2500" dirty="0" err="1" smtClean="0"/>
+              <a:t>ViewportWorldX</a:t>
+            </a:r>
+            <a:r>
+              <a:rPr lang="en-NZ" sz="2500" dirty="0" smtClean="0"/>
+              <a:t> </a:t>
+            </a:r>
+            <a:r>
+              <a:rPr lang="en-NZ" sz="2500" dirty="0"/>
+              <a:t>and </a:t>
+            </a:r>
+            <a:r>
+              <a:rPr lang="en-NZ" sz="2500" dirty="0" err="1" smtClean="0"/>
+              <a:t>ViewportWorldY</a:t>
+            </a:r>
+            <a:endParaRPr lang="en-NZ" sz="2500" dirty="0"/>
+          </a:p>
+          <a:p>
+            <a:pPr marL="1657350" lvl="2" indent="-742950">
+              <a:buFont typeface="Arial" panose="020B0604020202020204" pitchFamily="34" charset="0"/>
+              <a:buChar char="•"/>
+            </a:pPr>
+            <a:r>
+              <a:rPr lang="en-NZ" sz="2500" dirty="0"/>
+              <a:t>Add bounds </a:t>
+            </a:r>
+            <a:r>
+              <a:rPr lang="en-NZ" sz="2500" dirty="0" smtClean="0"/>
+              <a:t>checking</a:t>
+            </a:r>
+            <a:endParaRPr lang="en-NZ" sz="2500" dirty="0"/>
           </a:p>
           <a:p>
             <a:pPr marL="1657350" lvl="2" indent="-742950">
@@ -6746,11 +8422,7 @@
             <a:pPr lvl="1"/>
             <a:r>
               <a:rPr lang="en-AU" sz="3500" b="1" dirty="0" smtClean="0"/>
-              <a:t>Example </a:t>
-            </a:r>
-            <a:r>
-              <a:rPr lang="en-AU" sz="3500" b="1" dirty="0" smtClean="0"/>
-              <a:t>world</a:t>
+              <a:t>Example world</a:t>
             </a:r>
             <a:endParaRPr lang="en-US" sz="3500" b="1" dirty="0" smtClean="0"/>
           </a:p>
@@ -6797,7 +8469,6 @@
               <a:rPr lang="en-US" sz="2500" dirty="0" smtClean="0"/>
               <a:t>	screen high (211 tiles wide and 14 tiles high)</a:t>
             </a:r>
-            <a:endParaRPr lang="en-US" sz="2500" dirty="0" smtClean="0"/>
           </a:p>
           <a:p>
             <a:pPr marL="1657350" lvl="2" indent="-742950">
@@ -6943,7 +8614,6 @@
               <a:rPr lang="en-US" sz="2500" dirty="0" smtClean="0"/>
               <a:t>Viewport is 18 tiles wide and 14 tiles high</a:t>
             </a:r>
-            <a:endParaRPr lang="en-US" sz="2500" dirty="0" smtClean="0"/>
           </a:p>
           <a:p>
             <a:pPr marL="1657350" lvl="2" indent="-742950">
@@ -7493,7 +9163,7 @@
         <p:spPr>
           <a:xfrm>
             <a:off x="0" y="0"/>
-            <a:ext cx="9144000" cy="1631216"/>
+            <a:ext cx="9144000" cy="1092607"/>
           </a:xfrm>
           <a:prstGeom prst="rect">
             <a:avLst/>
@@ -7507,14 +9177,6 @@
           <a:p>
             <a:pPr algn="ctr"/>
             <a:endParaRPr lang="en-US" sz="4000" b="1" dirty="0"/>
-          </a:p>
-          <a:p>
-            <a:pPr lvl="1"/>
-            <a:r>
-              <a:rPr lang="en-AU" sz="3500" b="1" dirty="0" smtClean="0"/>
-              <a:t>Coordinate systems</a:t>
-            </a:r>
-            <a:endParaRPr lang="en-US" sz="3500" b="1" dirty="0" smtClean="0"/>
           </a:p>
           <a:p>
             <a:pPr marL="1657350" lvl="2" indent="-742950">
@@ -8376,8 +10038,8 @@
         </p:nvSpPr>
         <p:spPr>
           <a:xfrm>
-            <a:off x="2884763" y="4267200"/>
-            <a:ext cx="223443" cy="228600"/>
+            <a:off x="2917273" y="4343400"/>
+            <a:ext cx="130727" cy="123974"/>
           </a:xfrm>
           <a:prstGeom prst="rect">
             <a:avLst/>
@@ -8654,7 +10316,6 @@
               <a:rPr lang="en-US" sz="2500" dirty="0" smtClean="0"/>
               <a:t>your screen dimensions</a:t>
             </a:r>
-            <a:endParaRPr lang="en-US" sz="2500" dirty="0" smtClean="0"/>
           </a:p>
           <a:p>
             <a:pPr marL="1657350" lvl="2" indent="-742950">

</xml_diff>